<commit_message>
slide with MER fixed and more things on the justification
</commit_message>
<xml_diff>
--- a/slides/PreviaTCC.pptx
+++ b/slides/PreviaTCC.pptx
@@ -19,9 +19,9 @@
     <p:sldId id="260" r:id="rId10"/>
     <p:sldId id="278" r:id="rId11"/>
     <p:sldId id="290" r:id="rId12"/>
-    <p:sldId id="287" r:id="rId13"/>
-    <p:sldId id="288" r:id="rId14"/>
-    <p:sldId id="289" r:id="rId15"/>
+    <p:sldId id="289" r:id="rId13"/>
+    <p:sldId id="287" r:id="rId14"/>
+    <p:sldId id="288" r:id="rId15"/>
     <p:sldId id="268" r:id="rId16"/>
     <p:sldId id="263" r:id="rId17"/>
     <p:sldId id="284" r:id="rId18"/>
@@ -7986,7 +7986,7 @@
           <a:p>
             <a:fld id="{E5ED53A9-0795-4862-BFCB-6F97163CF4AD}" type="datetimeFigureOut">
               <a:rPr lang="pt-BR" smtClean="0"/>
-              <a:t>07/11/2020</a:t>
+              <a:t>08/11/2020</a:t>
             </a:fld>
             <a:endParaRPr lang="pt-BR"/>
           </a:p>
@@ -8381,10 +8381,7 @@
           <a:bodyPr/>
           <a:lstStyle/>
           <a:p>
-            <a:r>
-              <a:rPr lang="pt-BR" dirty="0"/>
-              <a:t>																																																																																				</a:t>
-            </a:r>
+            <a:endParaRPr lang="pt-BR" dirty="0"/>
           </a:p>
         </p:txBody>
       </p:sp>
@@ -8414,7 +8411,7 @@
     </p:spTree>
     <p:extLst>
       <p:ext uri="{BB962C8B-B14F-4D97-AF65-F5344CB8AC3E}">
-        <p14:creationId xmlns:p14="http://schemas.microsoft.com/office/powerpoint/2010/main" val="2409552032"/>
+        <p14:creationId xmlns:p14="http://schemas.microsoft.com/office/powerpoint/2010/main" val="2409755100"/>
       </p:ext>
     </p:extLst>
   </p:cSld>
@@ -8468,7 +8465,10 @@
           <a:bodyPr/>
           <a:lstStyle/>
           <a:p>
-            <a:endParaRPr lang="pt-BR" dirty="0"/>
+            <a:r>
+              <a:rPr lang="pt-BR" dirty="0"/>
+              <a:t>																																																																																				</a:t>
+            </a:r>
           </a:p>
         </p:txBody>
       </p:sp>
@@ -8489,7 +8489,7 @@
           <a:p>
             <a:fld id="{E9DBB54D-5D2E-412F-8A32-C4F9E6E6F85F}" type="slidenum">
               <a:rPr lang="pt-BR" smtClean="0"/>
-              <a:t>14</a:t>
+              <a:t>13</a:t>
             </a:fld>
             <a:endParaRPr lang="pt-BR"/>
           </a:p>
@@ -8498,7 +8498,7 @@
     </p:spTree>
     <p:extLst>
       <p:ext uri="{BB962C8B-B14F-4D97-AF65-F5344CB8AC3E}">
-        <p14:creationId xmlns:p14="http://schemas.microsoft.com/office/powerpoint/2010/main" val="2409755100"/>
+        <p14:creationId xmlns:p14="http://schemas.microsoft.com/office/powerpoint/2010/main" val="2409552032"/>
       </p:ext>
     </p:extLst>
   </p:cSld>
@@ -8908,7 +8908,7 @@
             <a:fld id="{87DE6118-2437-4B30-8E3C-4D2BE6020583}" type="datetimeFigureOut">
               <a:rPr lang="en-US" smtClean="0"/>
               <a:pPr/>
-              <a:t>11/7/2020</a:t>
+              <a:t>11/8/2020</a:t>
             </a:fld>
             <a:endParaRPr lang="en-US" dirty="0"/>
           </a:p>
@@ -9108,7 +9108,7 @@
             <a:fld id="{87DE6118-2437-4B30-8E3C-4D2BE6020583}" type="datetimeFigureOut">
               <a:rPr lang="en-US" smtClean="0"/>
               <a:pPr/>
-              <a:t>11/7/2020</a:t>
+              <a:t>11/8/2020</a:t>
             </a:fld>
             <a:endParaRPr lang="en-US" dirty="0"/>
           </a:p>
@@ -9318,7 +9318,7 @@
             <a:fld id="{87DE6118-2437-4B30-8E3C-4D2BE6020583}" type="datetimeFigureOut">
               <a:rPr lang="en-US" smtClean="0"/>
               <a:pPr/>
-              <a:t>11/7/2020</a:t>
+              <a:t>11/8/2020</a:t>
             </a:fld>
             <a:endParaRPr lang="en-US" dirty="0"/>
           </a:p>
@@ -9518,7 +9518,7 @@
             <a:fld id="{87DE6118-2437-4B30-8E3C-4D2BE6020583}" type="datetimeFigureOut">
               <a:rPr lang="en-US" smtClean="0"/>
               <a:pPr/>
-              <a:t>11/7/2020</a:t>
+              <a:t>11/8/2020</a:t>
             </a:fld>
             <a:endParaRPr lang="en-US" dirty="0"/>
           </a:p>
@@ -9795,7 +9795,7 @@
             <a:fld id="{87DE6118-2437-4B30-8E3C-4D2BE6020583}" type="datetimeFigureOut">
               <a:rPr lang="en-US" smtClean="0"/>
               <a:pPr/>
-              <a:t>11/7/2020</a:t>
+              <a:t>11/8/2020</a:t>
             </a:fld>
             <a:endParaRPr lang="en-US" dirty="0"/>
           </a:p>
@@ -10062,7 +10062,7 @@
             <a:fld id="{87DE6118-2437-4B30-8E3C-4D2BE6020583}" type="datetimeFigureOut">
               <a:rPr lang="en-US" smtClean="0"/>
               <a:pPr/>
-              <a:t>11/7/2020</a:t>
+              <a:t>11/8/2020</a:t>
             </a:fld>
             <a:endParaRPr lang="en-US" dirty="0"/>
           </a:p>
@@ -10476,7 +10476,7 @@
             <a:fld id="{87DE6118-2437-4B30-8E3C-4D2BE6020583}" type="datetimeFigureOut">
               <a:rPr lang="en-US" smtClean="0"/>
               <a:pPr/>
-              <a:t>11/7/2020</a:t>
+              <a:t>11/8/2020</a:t>
             </a:fld>
             <a:endParaRPr lang="en-US" dirty="0"/>
           </a:p>
@@ -10619,7 +10619,7 @@
             <a:fld id="{87DE6118-2437-4B30-8E3C-4D2BE6020583}" type="datetimeFigureOut">
               <a:rPr lang="en-US" smtClean="0"/>
               <a:pPr/>
-              <a:t>11/7/2020</a:t>
+              <a:t>11/8/2020</a:t>
             </a:fld>
             <a:endParaRPr lang="en-US" dirty="0"/>
           </a:p>
@@ -10734,7 +10734,7 @@
             <a:fld id="{87DE6118-2437-4B30-8E3C-4D2BE6020583}" type="datetimeFigureOut">
               <a:rPr lang="en-US" smtClean="0"/>
               <a:pPr/>
-              <a:t>11/7/2020</a:t>
+              <a:t>11/8/2020</a:t>
             </a:fld>
             <a:endParaRPr lang="en-US" dirty="0"/>
           </a:p>
@@ -11047,7 +11047,7 @@
             <a:fld id="{87DE6118-2437-4B30-8E3C-4D2BE6020583}" type="datetimeFigureOut">
               <a:rPr lang="en-US" smtClean="0"/>
               <a:pPr/>
-              <a:t>11/7/2020</a:t>
+              <a:t>11/8/2020</a:t>
             </a:fld>
             <a:endParaRPr lang="en-US" dirty="0"/>
           </a:p>
@@ -11337,7 +11337,7 @@
             <a:fld id="{87DE6118-2437-4B30-8E3C-4D2BE6020583}" type="datetimeFigureOut">
               <a:rPr lang="en-US" smtClean="0"/>
               <a:pPr/>
-              <a:t>11/7/2020</a:t>
+              <a:t>11/8/2020</a:t>
             </a:fld>
             <a:endParaRPr lang="en-US" dirty="0"/>
           </a:p>
@@ -11580,7 +11580,7 @@
             <a:fld id="{87DE6118-2437-4B30-8E3C-4D2BE6020583}" type="datetimeFigureOut">
               <a:rPr lang="en-US" smtClean="0"/>
               <a:pPr/>
-              <a:t>11/7/2020</a:t>
+              <a:t>11/8/2020</a:t>
             </a:fld>
             <a:endParaRPr lang="en-US" dirty="0"/>
           </a:p>
@@ -14729,7 +14729,7 @@
                                     <p:cond delay="0"/>
                                   </p:stCondLst>
                                   <p:childTnLst>
-                                    <p:animMotion origin="layout" path="M 3.125E-6 3.7037E-7 L -0.1418 0.24468 " pathEditMode="relative" rAng="0" ptsTypes="AA">
+                                    <p:animMotion origin="layout" path="M 0.10455 -0.17569 L -2.91667E-6 -7.40741E-7 " pathEditMode="relative" rAng="0" ptsTypes="AA">
                                       <p:cBhvr>
                                         <p:cTn id="8" dur="2000" fill="hold"/>
                                         <p:tgtEl>
@@ -14740,7 +14740,7 @@
                                           <p:attrName>ppt_y</p:attrName>
                                         </p:attrNameLst>
                                       </p:cBhvr>
-                                      <p:rCtr x="-7096" y="12245"/>
+                                      <p:rCtr x="-4727" y="12153"/>
                                     </p:animMotion>
                                   </p:childTnLst>
                                 </p:cTn>
@@ -15424,6 +15424,947 @@
 </file>
 
 <file path=ppt/slides/slide12.xml><?xml version="1.0" encoding="utf-8"?>
+<p:sld xmlns:a="http://schemas.openxmlformats.org/drawingml/2006/main" xmlns:r="http://schemas.openxmlformats.org/officeDocument/2006/relationships" xmlns:p="http://schemas.openxmlformats.org/presentationml/2006/main">
+  <p:cSld>
+    <p:spTree>
+      <p:nvGrpSpPr>
+        <p:cNvPr id="1" name=""/>
+        <p:cNvGrpSpPr/>
+        <p:nvPr/>
+      </p:nvGrpSpPr>
+      <p:grpSpPr>
+        <a:xfrm>
+          <a:off x="0" y="0"/>
+          <a:ext cx="0" cy="0"/>
+          <a:chOff x="0" y="0"/>
+          <a:chExt cx="0" cy="0"/>
+        </a:xfrm>
+      </p:grpSpPr>
+      <p:sp>
+        <p:nvSpPr>
+          <p:cNvPr id="2" name="Título 1">
+            <a:extLst>
+              <a:ext uri="{FF2B5EF4-FFF2-40B4-BE49-F238E27FC236}">
+                <a16:creationId xmlns:a16="http://schemas.microsoft.com/office/drawing/2014/main" id="{FA69FA04-D0D3-4B04-A9F1-8023C785649F}"/>
+              </a:ext>
+            </a:extLst>
+          </p:cNvPr>
+          <p:cNvSpPr>
+            <a:spLocks noGrp="1"/>
+          </p:cNvSpPr>
+          <p:nvPr>
+            <p:ph type="title"/>
+          </p:nvPr>
+        </p:nvSpPr>
+        <p:spPr/>
+        <p:txBody>
+          <a:bodyPr>
+            <a:normAutofit/>
+          </a:bodyPr>
+          <a:lstStyle/>
+          <a:p>
+            <a:r>
+              <a:rPr lang="pt-BR" sz="2300" b="1" dirty="0">
+                <a:latin typeface="Arial" panose="020B0604020202020204" pitchFamily="34" charset="0"/>
+                <a:cs typeface="Arial" panose="020B0604020202020204" pitchFamily="34" charset="0"/>
+              </a:rPr>
+              <a:t>Justificativa</a:t>
+            </a:r>
+          </a:p>
+        </p:txBody>
+      </p:sp>
+      <p:sp>
+        <p:nvSpPr>
+          <p:cNvPr id="4" name="CaixaDeTexto 3">
+            <a:extLst>
+              <a:ext uri="{FF2B5EF4-FFF2-40B4-BE49-F238E27FC236}">
+                <a16:creationId xmlns:a16="http://schemas.microsoft.com/office/drawing/2014/main" id="{F1F82824-081C-4CE5-A14A-6834E35D1FDE}"/>
+              </a:ext>
+            </a:extLst>
+          </p:cNvPr>
+          <p:cNvSpPr txBox="1"/>
+          <p:nvPr/>
+        </p:nvSpPr>
+        <p:spPr>
+          <a:xfrm>
+            <a:off x="5069839" y="1702778"/>
+            <a:ext cx="6675539" cy="1200329"/>
+          </a:xfrm>
+          <a:prstGeom prst="rect">
+            <a:avLst/>
+          </a:prstGeom>
+          <a:noFill/>
+        </p:spPr>
+        <p:txBody>
+          <a:bodyPr wrap="square">
+            <a:spAutoFit/>
+          </a:bodyPr>
+          <a:lstStyle/>
+          <a:p>
+            <a:r>
+              <a:rPr lang="pt-BR" sz="1800" dirty="0">
+                <a:solidFill>
+                  <a:srgbClr val="837E7E"/>
+                </a:solidFill>
+                <a:latin typeface="Arial" panose="020B0604020202020204" pitchFamily="34" charset="0"/>
+                <a:cs typeface="Arial" panose="020B0604020202020204" pitchFamily="34" charset="0"/>
+              </a:rPr>
+              <a:t>Atualmente a desistência no ensino superior vem se elevando, sendo o reflexo do ensino fundamental, com um número alto de evasão, e piorando os números em relação a matéria de matemática que envolve a lógica do aluno.</a:t>
+            </a:r>
+          </a:p>
+        </p:txBody>
+      </p:sp>
+      <p:pic>
+        <p:nvPicPr>
+          <p:cNvPr id="5" name="Picture 4" descr="Key West Web Design">
+            <a:extLst>
+              <a:ext uri="{FF2B5EF4-FFF2-40B4-BE49-F238E27FC236}">
+                <a16:creationId xmlns:a16="http://schemas.microsoft.com/office/drawing/2014/main" id="{C0F2981F-E1B4-4CDB-953A-3527F0919FD1}"/>
+              </a:ext>
+            </a:extLst>
+          </p:cNvPr>
+          <p:cNvPicPr>
+            <a:picLocks noChangeAspect="1" noChangeArrowheads="1"/>
+          </p:cNvPicPr>
+          <p:nvPr/>
+        </p:nvPicPr>
+        <p:blipFill>
+          <a:blip r:embed="rId3">
+            <a:extLst>
+              <a:ext uri="{28A0092B-C50C-407E-A947-70E740481C1C}">
+                <a14:useLocalDpi xmlns:a14="http://schemas.microsoft.com/office/drawing/2010/main" val="0"/>
+              </a:ext>
+            </a:extLst>
+          </a:blip>
+          <a:srcRect/>
+          <a:stretch>
+            <a:fillRect/>
+          </a:stretch>
+        </p:blipFill>
+        <p:spPr bwMode="auto">
+          <a:xfrm>
+            <a:off x="-5958665" y="4017443"/>
+            <a:ext cx="8780463" cy="6858000"/>
+          </a:xfrm>
+          <a:prstGeom prst="rect">
+            <a:avLst/>
+          </a:prstGeom>
+          <a:noFill/>
+          <a:extLst>
+            <a:ext uri="{909E8E84-426E-40DD-AFC4-6F175D3DCCD1}">
+              <a14:hiddenFill xmlns:a14="http://schemas.microsoft.com/office/drawing/2010/main">
+                <a:solidFill>
+                  <a:srgbClr val="FFFFFF"/>
+                </a:solidFill>
+              </a14:hiddenFill>
+            </a:ext>
+          </a:extLst>
+        </p:spPr>
+      </p:pic>
+      <p:pic>
+        <p:nvPicPr>
+          <p:cNvPr id="6" name="Picture 4" descr="Key West Web Design">
+            <a:extLst>
+              <a:ext uri="{FF2B5EF4-FFF2-40B4-BE49-F238E27FC236}">
+                <a16:creationId xmlns:a16="http://schemas.microsoft.com/office/drawing/2014/main" id="{6774D9D7-F50C-4630-85EA-56BD19A769C8}"/>
+              </a:ext>
+            </a:extLst>
+          </p:cNvPr>
+          <p:cNvPicPr>
+            <a:picLocks noChangeAspect="1" noChangeArrowheads="1"/>
+          </p:cNvPicPr>
+          <p:nvPr/>
+        </p:nvPicPr>
+        <p:blipFill>
+          <a:blip r:embed="rId3">
+            <a:extLst>
+              <a:ext uri="{28A0092B-C50C-407E-A947-70E740481C1C}">
+                <a14:useLocalDpi xmlns:a14="http://schemas.microsoft.com/office/drawing/2010/main" val="0"/>
+              </a:ext>
+            </a:extLst>
+          </a:blip>
+          <a:srcRect/>
+          <a:stretch>
+            <a:fillRect/>
+          </a:stretch>
+        </p:blipFill>
+        <p:spPr bwMode="auto">
+          <a:xfrm>
+            <a:off x="9912625" y="-4555057"/>
+            <a:ext cx="8780463" cy="6858000"/>
+          </a:xfrm>
+          <a:prstGeom prst="rect">
+            <a:avLst/>
+          </a:prstGeom>
+          <a:noFill/>
+          <a:extLst>
+            <a:ext uri="{909E8E84-426E-40DD-AFC4-6F175D3DCCD1}">
+              <a14:hiddenFill xmlns:a14="http://schemas.microsoft.com/office/drawing/2010/main">
+                <a:solidFill>
+                  <a:srgbClr val="FFFFFF"/>
+                </a:solidFill>
+              </a14:hiddenFill>
+            </a:ext>
+          </a:extLst>
+        </p:spPr>
+      </p:pic>
+      <p:grpSp>
+        <p:nvGrpSpPr>
+          <p:cNvPr id="3" name="Agrupar 2">
+            <a:extLst>
+              <a:ext uri="{FF2B5EF4-FFF2-40B4-BE49-F238E27FC236}">
+                <a16:creationId xmlns:a16="http://schemas.microsoft.com/office/drawing/2014/main" id="{E7FF23A7-EABD-4B91-9409-6F19041163E5}"/>
+              </a:ext>
+            </a:extLst>
+          </p:cNvPr>
+          <p:cNvGrpSpPr/>
+          <p:nvPr/>
+        </p:nvGrpSpPr>
+        <p:grpSpPr>
+          <a:xfrm>
+            <a:off x="1278747" y="2168111"/>
+            <a:ext cx="3086100" cy="2686050"/>
+            <a:chOff x="1278747" y="2168111"/>
+            <a:chExt cx="3086100" cy="2686050"/>
+          </a:xfrm>
+        </p:grpSpPr>
+        <p:pic>
+          <p:nvPicPr>
+            <p:cNvPr id="8" name="Gráfico 7">
+              <a:extLst>
+                <a:ext uri="{FF2B5EF4-FFF2-40B4-BE49-F238E27FC236}">
+                  <a16:creationId xmlns:a16="http://schemas.microsoft.com/office/drawing/2014/main" id="{1D4A2140-E547-40A2-8A9E-0FB6196354AD}"/>
+                </a:ext>
+              </a:extLst>
+            </p:cNvPr>
+            <p:cNvPicPr>
+              <a:picLocks noChangeAspect="1"/>
+            </p:cNvPicPr>
+            <p:nvPr/>
+          </p:nvPicPr>
+          <p:blipFill>
+            <a:blip r:embed="rId4">
+              <a:extLst>
+                <a:ext uri="{96DAC541-7B7A-43D3-8B79-37D633B846F1}">
+                  <asvg:svgBlip xmlns:asvg="http://schemas.microsoft.com/office/drawing/2016/SVG/main" r:embed="rId5"/>
+                </a:ext>
+              </a:extLst>
+            </a:blip>
+            <a:stretch>
+              <a:fillRect/>
+            </a:stretch>
+          </p:blipFill>
+          <p:spPr>
+            <a:xfrm>
+              <a:off x="1278747" y="2168111"/>
+              <a:ext cx="3086100" cy="2686050"/>
+            </a:xfrm>
+            <a:prstGeom prst="rect">
+              <a:avLst/>
+            </a:prstGeom>
+          </p:spPr>
+        </p:pic>
+        <p:sp>
+          <p:nvSpPr>
+            <p:cNvPr id="10" name="CaixaDeTexto 9">
+              <a:extLst>
+                <a:ext uri="{FF2B5EF4-FFF2-40B4-BE49-F238E27FC236}">
+                  <a16:creationId xmlns:a16="http://schemas.microsoft.com/office/drawing/2014/main" id="{53F9D72B-D84F-459F-A427-AB2292E34731}"/>
+                </a:ext>
+              </a:extLst>
+            </p:cNvPr>
+            <p:cNvSpPr txBox="1"/>
+            <p:nvPr/>
+          </p:nvSpPr>
+          <p:spPr>
+            <a:xfrm>
+              <a:off x="1837427" y="2413337"/>
+              <a:ext cx="2173856" cy="2031325"/>
+            </a:xfrm>
+            <a:prstGeom prst="rect">
+              <a:avLst/>
+            </a:prstGeom>
+            <a:noFill/>
+          </p:spPr>
+          <p:txBody>
+            <a:bodyPr wrap="square" rtlCol="0">
+              <a:spAutoFit/>
+            </a:bodyPr>
+            <a:lstStyle/>
+            <a:p>
+              <a:r>
+                <a:rPr lang="pt-BR" dirty="0">
+                  <a:latin typeface="Century" panose="02040604050505020304" pitchFamily="18" charset="0"/>
+                  <a:cs typeface="Aharoni" panose="02010803020104030203" pitchFamily="2" charset="-79"/>
+                </a:rPr>
+                <a:t>Em </a:t>
+              </a:r>
+              <a:r>
+                <a:rPr lang="pt-BR" sz="2000" dirty="0">
+                  <a:latin typeface="Century" panose="02040604050505020304" pitchFamily="18" charset="0"/>
+                  <a:cs typeface="Aharoni" panose="02010803020104030203" pitchFamily="2" charset="-79"/>
+                </a:rPr>
+                <a:t>2019</a:t>
+              </a:r>
+              <a:r>
+                <a:rPr lang="pt-BR" dirty="0">
+                  <a:latin typeface="Century" panose="02040604050505020304" pitchFamily="18" charset="0"/>
+                  <a:cs typeface="Aharoni" panose="02010803020104030203" pitchFamily="2" charset="-79"/>
+                </a:rPr>
+                <a:t> de </a:t>
+              </a:r>
+              <a:r>
+                <a:rPr lang="pt-BR" sz="2400" dirty="0">
+                  <a:solidFill>
+                    <a:schemeClr val="accent1"/>
+                  </a:solidFill>
+                  <a:latin typeface="Century" panose="02040604050505020304" pitchFamily="18" charset="0"/>
+                  <a:cs typeface="Aharoni" panose="02010803020104030203" pitchFamily="2" charset="-79"/>
+                </a:rPr>
+                <a:t>1,2</a:t>
+              </a:r>
+              <a:r>
+                <a:rPr lang="pt-BR" dirty="0">
+                  <a:solidFill>
+                    <a:schemeClr val="accent1"/>
+                  </a:solidFill>
+                  <a:latin typeface="Century" panose="02040604050505020304" pitchFamily="18" charset="0"/>
+                  <a:cs typeface="Aharoni" panose="02010803020104030203" pitchFamily="2" charset="-79"/>
+                </a:rPr>
+                <a:t> </a:t>
+              </a:r>
+              <a:r>
+                <a:rPr lang="pt-BR" sz="2400" dirty="0">
+                  <a:solidFill>
+                    <a:schemeClr val="accent1"/>
+                  </a:solidFill>
+                  <a:latin typeface="Century" panose="02040604050505020304" pitchFamily="18" charset="0"/>
+                  <a:cs typeface="Aharoni" panose="02010803020104030203" pitchFamily="2" charset="-79"/>
+                </a:rPr>
+                <a:t>milhões</a:t>
+              </a:r>
+              <a:r>
+                <a:rPr lang="pt-BR" dirty="0">
+                  <a:solidFill>
+                    <a:schemeClr val="accent1"/>
+                  </a:solidFill>
+                  <a:latin typeface="Century" panose="02040604050505020304" pitchFamily="18" charset="0"/>
+                  <a:cs typeface="Aharoni" panose="02010803020104030203" pitchFamily="2" charset="-79"/>
+                </a:rPr>
+                <a:t> </a:t>
+              </a:r>
+              <a:r>
+                <a:rPr lang="pt-BR" dirty="0">
+                  <a:latin typeface="Century" panose="02040604050505020304" pitchFamily="18" charset="0"/>
+                  <a:cs typeface="Aharoni" panose="02010803020104030203" pitchFamily="2" charset="-79"/>
+                </a:rPr>
+                <a:t>de estudantes somente </a:t>
+              </a:r>
+              <a:r>
+                <a:rPr lang="pt-BR" sz="2400" dirty="0">
+                  <a:solidFill>
+                    <a:srgbClr val="FF0000"/>
+                  </a:solidFill>
+                  <a:latin typeface="Century" panose="02040604050505020304" pitchFamily="18" charset="0"/>
+                  <a:cs typeface="Aharoni" panose="02010803020104030203" pitchFamily="2" charset="-79"/>
+                </a:rPr>
+                <a:t>14</a:t>
+              </a:r>
+              <a:r>
+                <a:rPr lang="pt-BR" dirty="0">
+                  <a:solidFill>
+                    <a:srgbClr val="FF0000"/>
+                  </a:solidFill>
+                  <a:latin typeface="Century" panose="02040604050505020304" pitchFamily="18" charset="0"/>
+                  <a:cs typeface="Aharoni" panose="02010803020104030203" pitchFamily="2" charset="-79"/>
+                </a:rPr>
+                <a:t> </a:t>
+              </a:r>
+              <a:r>
+                <a:rPr lang="pt-BR" sz="2400" dirty="0">
+                  <a:solidFill>
+                    <a:srgbClr val="FF0000"/>
+                  </a:solidFill>
+                  <a:latin typeface="Century" panose="02040604050505020304" pitchFamily="18" charset="0"/>
+                  <a:cs typeface="Aharoni" panose="02010803020104030203" pitchFamily="2" charset="-79"/>
+                </a:rPr>
+                <a:t>mil </a:t>
+              </a:r>
+              <a:r>
+                <a:rPr lang="pt-BR" dirty="0">
+                  <a:latin typeface="Century" panose="02040604050505020304" pitchFamily="18" charset="0"/>
+                  <a:cs typeface="Aharoni" panose="02010803020104030203" pitchFamily="2" charset="-79"/>
+                </a:rPr>
+                <a:t>terminaram a graduação</a:t>
+              </a:r>
+            </a:p>
+          </p:txBody>
+        </p:sp>
+      </p:grpSp>
+      <p:pic>
+        <p:nvPicPr>
+          <p:cNvPr id="14" name="Gráfico 13">
+            <a:extLst>
+              <a:ext uri="{FF2B5EF4-FFF2-40B4-BE49-F238E27FC236}">
+                <a16:creationId xmlns:a16="http://schemas.microsoft.com/office/drawing/2014/main" id="{1EB1CF3C-4E5A-4E5D-9FE5-FE6EE12F7EB3}"/>
+              </a:ext>
+            </a:extLst>
+          </p:cNvPr>
+          <p:cNvPicPr>
+            <a:picLocks noChangeAspect="1"/>
+          </p:cNvPicPr>
+          <p:nvPr/>
+        </p:nvPicPr>
+        <p:blipFill>
+          <a:blip r:embed="rId6">
+            <a:extLst>
+              <a:ext uri="{96DAC541-7B7A-43D3-8B79-37D633B846F1}">
+                <asvg:svgBlip xmlns:asvg="http://schemas.microsoft.com/office/drawing/2016/SVG/main" r:embed="rId7"/>
+              </a:ext>
+            </a:extLst>
+          </a:blip>
+          <a:stretch>
+            <a:fillRect/>
+          </a:stretch>
+        </p:blipFill>
+        <p:spPr>
+          <a:xfrm flipH="1">
+            <a:off x="9056310" y="4125654"/>
+            <a:ext cx="2865138" cy="2485216"/>
+          </a:xfrm>
+          <a:prstGeom prst="rect">
+            <a:avLst/>
+          </a:prstGeom>
+        </p:spPr>
+      </p:pic>
+      <p:pic>
+        <p:nvPicPr>
+          <p:cNvPr id="22" name="Gráfico 21">
+            <a:extLst>
+              <a:ext uri="{FF2B5EF4-FFF2-40B4-BE49-F238E27FC236}">
+                <a16:creationId xmlns:a16="http://schemas.microsoft.com/office/drawing/2014/main" id="{BCB9E001-2441-4653-9A0E-01A90E27648D}"/>
+              </a:ext>
+            </a:extLst>
+          </p:cNvPr>
+          <p:cNvPicPr>
+            <a:picLocks noChangeAspect="1"/>
+          </p:cNvPicPr>
+          <p:nvPr/>
+        </p:nvPicPr>
+        <p:blipFill>
+          <a:blip r:embed="rId8">
+            <a:extLst>
+              <a:ext uri="{96DAC541-7B7A-43D3-8B79-37D633B846F1}">
+                <asvg:svgBlip xmlns:asvg="http://schemas.microsoft.com/office/drawing/2016/SVG/main" r:embed="rId9"/>
+              </a:ext>
+            </a:extLst>
+          </a:blip>
+          <a:stretch>
+            <a:fillRect/>
+          </a:stretch>
+        </p:blipFill>
+        <p:spPr>
+          <a:xfrm>
+            <a:off x="5632781" y="3437810"/>
+            <a:ext cx="3760960" cy="2398355"/>
+          </a:xfrm>
+          <a:prstGeom prst="rect">
+            <a:avLst/>
+          </a:prstGeom>
+        </p:spPr>
+      </p:pic>
+      <p:sp>
+        <p:nvSpPr>
+          <p:cNvPr id="24" name="CaixaDeTexto 23">
+            <a:extLst>
+              <a:ext uri="{FF2B5EF4-FFF2-40B4-BE49-F238E27FC236}">
+                <a16:creationId xmlns:a16="http://schemas.microsoft.com/office/drawing/2014/main" id="{0C97E24D-7090-454A-88ED-364890F3B736}"/>
+              </a:ext>
+            </a:extLst>
+          </p:cNvPr>
+          <p:cNvSpPr txBox="1"/>
+          <p:nvPr/>
+        </p:nvSpPr>
+        <p:spPr>
+          <a:xfrm>
+            <a:off x="5747912" y="3493229"/>
+            <a:ext cx="3530697" cy="2015936"/>
+          </a:xfrm>
+          <a:prstGeom prst="rect">
+            <a:avLst/>
+          </a:prstGeom>
+          <a:noFill/>
+        </p:spPr>
+        <p:txBody>
+          <a:bodyPr wrap="square">
+            <a:spAutoFit/>
+          </a:bodyPr>
+          <a:lstStyle/>
+          <a:p>
+            <a:r>
+              <a:rPr lang="pt-BR" dirty="0">
+                <a:latin typeface="Century" panose="02040604050505020304" pitchFamily="18" charset="0"/>
+              </a:rPr>
+              <a:t>Somente na ETEC de Guaianazes o total de alunos desistentes cursando Desenvolvimento de Sistemas de 2019 para 2020 foram mais de 33%</a:t>
+            </a:r>
+          </a:p>
+          <a:p>
+            <a:endParaRPr lang="pt-BR" sz="1700" dirty="0">
+              <a:latin typeface="Century" panose="02040604050505020304" pitchFamily="18" charset="0"/>
+            </a:endParaRPr>
+          </a:p>
+        </p:txBody>
+      </p:sp>
+      <p:sp>
+        <p:nvSpPr>
+          <p:cNvPr id="25" name="CaixaDeTexto 24">
+            <a:extLst>
+              <a:ext uri="{FF2B5EF4-FFF2-40B4-BE49-F238E27FC236}">
+                <a16:creationId xmlns:a16="http://schemas.microsoft.com/office/drawing/2014/main" id="{84F1BAEF-4572-4343-88C2-912E216348CD}"/>
+              </a:ext>
+            </a:extLst>
+          </p:cNvPr>
+          <p:cNvSpPr txBox="1"/>
+          <p:nvPr/>
+        </p:nvSpPr>
+        <p:spPr>
+          <a:xfrm flipH="1">
+            <a:off x="3877193" y="6247349"/>
+            <a:ext cx="2799360" cy="276999"/>
+          </a:xfrm>
+          <a:prstGeom prst="rect">
+            <a:avLst/>
+          </a:prstGeom>
+          <a:noFill/>
+        </p:spPr>
+        <p:txBody>
+          <a:bodyPr wrap="square" rtlCol="0">
+            <a:spAutoFit/>
+          </a:bodyPr>
+          <a:lstStyle/>
+          <a:p>
+            <a:r>
+              <a:rPr lang="pt-BR" sz="1200" dirty="0">
+                <a:latin typeface="Century" panose="02040604050505020304" pitchFamily="18" charset="0"/>
+              </a:rPr>
+              <a:t>Fonte https://www.gov.br/inep/pt-br </a:t>
+            </a:r>
+          </a:p>
+        </p:txBody>
+      </p:sp>
+    </p:spTree>
+    <p:extLst>
+      <p:ext uri="{BB962C8B-B14F-4D97-AF65-F5344CB8AC3E}">
+        <p14:creationId xmlns:p14="http://schemas.microsoft.com/office/powerpoint/2010/main" val="1449505509"/>
+      </p:ext>
+    </p:extLst>
+  </p:cSld>
+  <p:clrMapOvr>
+    <a:masterClrMapping/>
+  </p:clrMapOvr>
+  <p:timing>
+    <p:tnLst>
+      <p:par>
+        <p:cTn id="1" dur="indefinite" restart="never" nodeType="tmRoot">
+          <p:childTnLst>
+            <p:seq concurrent="1" nextAc="seek">
+              <p:cTn id="2" dur="indefinite" nodeType="mainSeq">
+                <p:childTnLst>
+                  <p:par>
+                    <p:cTn id="3" fill="hold">
+                      <p:stCondLst>
+                        <p:cond delay="indefinite"/>
+                        <p:cond evt="onBegin" delay="0">
+                          <p:tn val="2"/>
+                        </p:cond>
+                      </p:stCondLst>
+                      <p:childTnLst>
+                        <p:par>
+                          <p:cTn id="4" fill="hold">
+                            <p:stCondLst>
+                              <p:cond delay="0"/>
+                            </p:stCondLst>
+                            <p:childTnLst>
+                              <p:par>
+                                <p:cTn id="5" presetID="42" presetClass="path" presetSubtype="0" accel="50000" decel="50000" fill="hold" nodeType="withEffect">
+                                  <p:stCondLst>
+                                    <p:cond delay="0"/>
+                                  </p:stCondLst>
+                                  <p:childTnLst>
+                                    <p:animMotion origin="layout" path="M -0.14518 0.14792 L -0.05481 0.04861 " pathEditMode="relative" rAng="0" ptsTypes="AA">
+                                      <p:cBhvr>
+                                        <p:cTn id="6" dur="2000" fill="hold"/>
+                                        <p:tgtEl>
+                                          <p:spTgt spid="5"/>
+                                        </p:tgtEl>
+                                        <p:attrNameLst>
+                                          <p:attrName>ppt_x</p:attrName>
+                                          <p:attrName>ppt_y</p:attrName>
+                                        </p:attrNameLst>
+                                      </p:cBhvr>
+                                      <p:rCtr x="4518" y="-4977"/>
+                                    </p:animMotion>
+                                  </p:childTnLst>
+                                </p:cTn>
+                              </p:par>
+                              <p:par>
+                                <p:cTn id="7" presetID="42" presetClass="path" presetSubtype="0" accel="50000" decel="50000" fill="hold" nodeType="withEffect">
+                                  <p:stCondLst>
+                                    <p:cond delay="0"/>
+                                  </p:stCondLst>
+                                  <p:childTnLst>
+                                    <p:animMotion origin="layout" path="M 0.18633 -0.26644 L 3.125E-6 3.7037E-7 " pathEditMode="relative" rAng="0" ptsTypes="AA">
+                                      <p:cBhvr>
+                                        <p:cTn id="8" dur="2000" fill="hold"/>
+                                        <p:tgtEl>
+                                          <p:spTgt spid="6"/>
+                                        </p:tgtEl>
+                                        <p:attrNameLst>
+                                          <p:attrName>ppt_x</p:attrName>
+                                          <p:attrName>ppt_y</p:attrName>
+                                        </p:attrNameLst>
+                                      </p:cBhvr>
+                                      <p:rCtr x="-9323" y="13333"/>
+                                    </p:animMotion>
+                                  </p:childTnLst>
+                                </p:cTn>
+                              </p:par>
+                              <p:par>
+                                <p:cTn id="9" presetID="10" presetClass="entr" presetSubtype="0" fill="hold" nodeType="withEffect">
+                                  <p:stCondLst>
+                                    <p:cond delay="0"/>
+                                  </p:stCondLst>
+                                  <p:childTnLst>
+                                    <p:set>
+                                      <p:cBhvr>
+                                        <p:cTn id="10" dur="1" fill="hold">
+                                          <p:stCondLst>
+                                            <p:cond delay="0"/>
+                                          </p:stCondLst>
+                                        </p:cTn>
+                                        <p:tgtEl>
+                                          <p:spTgt spid="3"/>
+                                        </p:tgtEl>
+                                        <p:attrNameLst>
+                                          <p:attrName>style.visibility</p:attrName>
+                                        </p:attrNameLst>
+                                      </p:cBhvr>
+                                      <p:to>
+                                        <p:strVal val="visible"/>
+                                      </p:to>
+                                    </p:set>
+                                    <p:animEffect transition="in" filter="fade">
+                                      <p:cBhvr>
+                                        <p:cTn id="11" dur="500"/>
+                                        <p:tgtEl>
+                                          <p:spTgt spid="3"/>
+                                        </p:tgtEl>
+                                      </p:cBhvr>
+                                    </p:animEffect>
+                                  </p:childTnLst>
+                                </p:cTn>
+                              </p:par>
+                              <p:par>
+                                <p:cTn id="12" presetID="42" presetClass="entr" presetSubtype="0" fill="hold" nodeType="withEffect">
+                                  <p:stCondLst>
+                                    <p:cond delay="0"/>
+                                  </p:stCondLst>
+                                  <p:childTnLst>
+                                    <p:set>
+                                      <p:cBhvr>
+                                        <p:cTn id="13" dur="1" fill="hold">
+                                          <p:stCondLst>
+                                            <p:cond delay="0"/>
+                                          </p:stCondLst>
+                                        </p:cTn>
+                                        <p:tgtEl>
+                                          <p:spTgt spid="14"/>
+                                        </p:tgtEl>
+                                        <p:attrNameLst>
+                                          <p:attrName>style.visibility</p:attrName>
+                                        </p:attrNameLst>
+                                      </p:cBhvr>
+                                      <p:to>
+                                        <p:strVal val="visible"/>
+                                      </p:to>
+                                    </p:set>
+                                    <p:animEffect transition="in" filter="fade">
+                                      <p:cBhvr>
+                                        <p:cTn id="14" dur="1000"/>
+                                        <p:tgtEl>
+                                          <p:spTgt spid="14"/>
+                                        </p:tgtEl>
+                                      </p:cBhvr>
+                                    </p:animEffect>
+                                    <p:anim calcmode="lin" valueType="num">
+                                      <p:cBhvr>
+                                        <p:cTn id="15" dur="1000" fill="hold"/>
+                                        <p:tgtEl>
+                                          <p:spTgt spid="14"/>
+                                        </p:tgtEl>
+                                        <p:attrNameLst>
+                                          <p:attrName>ppt_x</p:attrName>
+                                        </p:attrNameLst>
+                                      </p:cBhvr>
+                                      <p:tavLst>
+                                        <p:tav tm="0">
+                                          <p:val>
+                                            <p:strVal val="#ppt_x"/>
+                                          </p:val>
+                                        </p:tav>
+                                        <p:tav tm="100000">
+                                          <p:val>
+                                            <p:strVal val="#ppt_x"/>
+                                          </p:val>
+                                        </p:tav>
+                                      </p:tavLst>
+                                    </p:anim>
+                                    <p:anim calcmode="lin" valueType="num">
+                                      <p:cBhvr>
+                                        <p:cTn id="16" dur="1000" fill="hold"/>
+                                        <p:tgtEl>
+                                          <p:spTgt spid="14"/>
+                                        </p:tgtEl>
+                                        <p:attrNameLst>
+                                          <p:attrName>ppt_y</p:attrName>
+                                        </p:attrNameLst>
+                                      </p:cBhvr>
+                                      <p:tavLst>
+                                        <p:tav tm="0">
+                                          <p:val>
+                                            <p:strVal val="#ppt_y+.1"/>
+                                          </p:val>
+                                        </p:tav>
+                                        <p:tav tm="100000">
+                                          <p:val>
+                                            <p:strVal val="#ppt_y"/>
+                                          </p:val>
+                                        </p:tav>
+                                      </p:tavLst>
+                                    </p:anim>
+                                  </p:childTnLst>
+                                </p:cTn>
+                              </p:par>
+                              <p:par>
+                                <p:cTn id="17" presetID="42" presetClass="entr" presetSubtype="0" fill="hold" nodeType="withEffect">
+                                  <p:stCondLst>
+                                    <p:cond delay="0"/>
+                                  </p:stCondLst>
+                                  <p:childTnLst>
+                                    <p:set>
+                                      <p:cBhvr>
+                                        <p:cTn id="18" dur="1" fill="hold">
+                                          <p:stCondLst>
+                                            <p:cond delay="0"/>
+                                          </p:stCondLst>
+                                        </p:cTn>
+                                        <p:tgtEl>
+                                          <p:spTgt spid="22"/>
+                                        </p:tgtEl>
+                                        <p:attrNameLst>
+                                          <p:attrName>style.visibility</p:attrName>
+                                        </p:attrNameLst>
+                                      </p:cBhvr>
+                                      <p:to>
+                                        <p:strVal val="visible"/>
+                                      </p:to>
+                                    </p:set>
+                                    <p:animEffect transition="in" filter="fade">
+                                      <p:cBhvr>
+                                        <p:cTn id="19" dur="1000"/>
+                                        <p:tgtEl>
+                                          <p:spTgt spid="22"/>
+                                        </p:tgtEl>
+                                      </p:cBhvr>
+                                    </p:animEffect>
+                                    <p:anim calcmode="lin" valueType="num">
+                                      <p:cBhvr>
+                                        <p:cTn id="20" dur="1000" fill="hold"/>
+                                        <p:tgtEl>
+                                          <p:spTgt spid="22"/>
+                                        </p:tgtEl>
+                                        <p:attrNameLst>
+                                          <p:attrName>ppt_x</p:attrName>
+                                        </p:attrNameLst>
+                                      </p:cBhvr>
+                                      <p:tavLst>
+                                        <p:tav tm="0">
+                                          <p:val>
+                                            <p:strVal val="#ppt_x"/>
+                                          </p:val>
+                                        </p:tav>
+                                        <p:tav tm="100000">
+                                          <p:val>
+                                            <p:strVal val="#ppt_x"/>
+                                          </p:val>
+                                        </p:tav>
+                                      </p:tavLst>
+                                    </p:anim>
+                                    <p:anim calcmode="lin" valueType="num">
+                                      <p:cBhvr>
+                                        <p:cTn id="21" dur="1000" fill="hold"/>
+                                        <p:tgtEl>
+                                          <p:spTgt spid="22"/>
+                                        </p:tgtEl>
+                                        <p:attrNameLst>
+                                          <p:attrName>ppt_y</p:attrName>
+                                        </p:attrNameLst>
+                                      </p:cBhvr>
+                                      <p:tavLst>
+                                        <p:tav tm="0">
+                                          <p:val>
+                                            <p:strVal val="#ppt_y+.1"/>
+                                          </p:val>
+                                        </p:tav>
+                                        <p:tav tm="100000">
+                                          <p:val>
+                                            <p:strVal val="#ppt_y"/>
+                                          </p:val>
+                                        </p:tav>
+                                      </p:tavLst>
+                                    </p:anim>
+                                  </p:childTnLst>
+                                </p:cTn>
+                              </p:par>
+                              <p:par>
+                                <p:cTn id="22" presetID="42" presetClass="entr" presetSubtype="0" fill="hold" grpId="0" nodeType="withEffect">
+                                  <p:stCondLst>
+                                    <p:cond delay="0"/>
+                                  </p:stCondLst>
+                                  <p:childTnLst>
+                                    <p:set>
+                                      <p:cBhvr>
+                                        <p:cTn id="23" dur="1" fill="hold">
+                                          <p:stCondLst>
+                                            <p:cond delay="0"/>
+                                          </p:stCondLst>
+                                        </p:cTn>
+                                        <p:tgtEl>
+                                          <p:spTgt spid="24"/>
+                                        </p:tgtEl>
+                                        <p:attrNameLst>
+                                          <p:attrName>style.visibility</p:attrName>
+                                        </p:attrNameLst>
+                                      </p:cBhvr>
+                                      <p:to>
+                                        <p:strVal val="visible"/>
+                                      </p:to>
+                                    </p:set>
+                                    <p:animEffect transition="in" filter="fade">
+                                      <p:cBhvr>
+                                        <p:cTn id="24" dur="1000"/>
+                                        <p:tgtEl>
+                                          <p:spTgt spid="24"/>
+                                        </p:tgtEl>
+                                      </p:cBhvr>
+                                    </p:animEffect>
+                                    <p:anim calcmode="lin" valueType="num">
+                                      <p:cBhvr>
+                                        <p:cTn id="25" dur="1000" fill="hold"/>
+                                        <p:tgtEl>
+                                          <p:spTgt spid="24"/>
+                                        </p:tgtEl>
+                                        <p:attrNameLst>
+                                          <p:attrName>ppt_x</p:attrName>
+                                        </p:attrNameLst>
+                                      </p:cBhvr>
+                                      <p:tavLst>
+                                        <p:tav tm="0">
+                                          <p:val>
+                                            <p:strVal val="#ppt_x"/>
+                                          </p:val>
+                                        </p:tav>
+                                        <p:tav tm="100000">
+                                          <p:val>
+                                            <p:strVal val="#ppt_x"/>
+                                          </p:val>
+                                        </p:tav>
+                                      </p:tavLst>
+                                    </p:anim>
+                                    <p:anim calcmode="lin" valueType="num">
+                                      <p:cBhvr>
+                                        <p:cTn id="26" dur="1000" fill="hold"/>
+                                        <p:tgtEl>
+                                          <p:spTgt spid="24"/>
+                                        </p:tgtEl>
+                                        <p:attrNameLst>
+                                          <p:attrName>ppt_y</p:attrName>
+                                        </p:attrNameLst>
+                                      </p:cBhvr>
+                                      <p:tavLst>
+                                        <p:tav tm="0">
+                                          <p:val>
+                                            <p:strVal val="#ppt_y+.1"/>
+                                          </p:val>
+                                        </p:tav>
+                                        <p:tav tm="100000">
+                                          <p:val>
+                                            <p:strVal val="#ppt_y"/>
+                                          </p:val>
+                                        </p:tav>
+                                      </p:tavLst>
+                                    </p:anim>
+                                  </p:childTnLst>
+                                </p:cTn>
+                              </p:par>
+                              <p:par>
+                                <p:cTn id="27" presetID="35" presetClass="path" presetSubtype="0" accel="50000" decel="50000" fill="hold" grpId="0" nodeType="withEffect">
+                                  <p:stCondLst>
+                                    <p:cond delay="0"/>
+                                  </p:stCondLst>
+                                  <p:childTnLst>
+                                    <p:animMotion origin="layout" path="M 0.59167 3.7037E-7 L -2.5E-6 3.7037E-7 " pathEditMode="relative" rAng="0" ptsTypes="AA">
+                                      <p:cBhvr>
+                                        <p:cTn id="28" dur="2000" fill="hold"/>
+                                        <p:tgtEl>
+                                          <p:spTgt spid="4"/>
+                                        </p:tgtEl>
+                                        <p:attrNameLst>
+                                          <p:attrName>ppt_x</p:attrName>
+                                          <p:attrName>ppt_y</p:attrName>
+                                        </p:attrNameLst>
+                                      </p:cBhvr>
+                                      <p:rCtr x="-29609" y="0"/>
+                                    </p:animMotion>
+                                  </p:childTnLst>
+                                </p:cTn>
+                              </p:par>
+                            </p:childTnLst>
+                          </p:cTn>
+                        </p:par>
+                      </p:childTnLst>
+                    </p:cTn>
+                  </p:par>
+                </p:childTnLst>
+              </p:cTn>
+              <p:prevCondLst>
+                <p:cond evt="onPrev" delay="0">
+                  <p:tgtEl>
+                    <p:sldTgt/>
+                  </p:tgtEl>
+                </p:cond>
+              </p:prevCondLst>
+              <p:nextCondLst>
+                <p:cond evt="onNext" delay="0">
+                  <p:tgtEl>
+                    <p:sldTgt/>
+                  </p:tgtEl>
+                </p:cond>
+              </p:nextCondLst>
+            </p:seq>
+          </p:childTnLst>
+        </p:cTn>
+      </p:par>
+    </p:tnLst>
+    <p:bldLst>
+      <p:bldP spid="4" grpId="0"/>
+      <p:bldP spid="24" grpId="0"/>
+    </p:bldLst>
+  </p:timing>
+</p:sld>
+</file>
+
+<file path=ppt/slides/slide13.xml><?xml version="1.0" encoding="utf-8"?>
 <p:sld xmlns:a="http://schemas.openxmlformats.org/drawingml/2006/main" xmlns:r="http://schemas.openxmlformats.org/officeDocument/2006/relationships" xmlns:p="http://schemas.openxmlformats.org/presentationml/2006/main">
   <p:cSld>
     <p:spTree>
@@ -15993,6 +16934,123 @@
           </a:extLst>
         </p:spPr>
       </p:pic>
+      <p:grpSp>
+        <p:nvGrpSpPr>
+          <p:cNvPr id="5" name="Agrupar 4">
+            <a:extLst>
+              <a:ext uri="{FF2B5EF4-FFF2-40B4-BE49-F238E27FC236}">
+                <a16:creationId xmlns:a16="http://schemas.microsoft.com/office/drawing/2014/main" id="{547399E2-9344-4A4F-B138-BBC881F7C792}"/>
+              </a:ext>
+            </a:extLst>
+          </p:cNvPr>
+          <p:cNvGrpSpPr/>
+          <p:nvPr/>
+        </p:nvGrpSpPr>
+        <p:grpSpPr>
+          <a:xfrm>
+            <a:off x="7943078" y="3255215"/>
+            <a:ext cx="3452867" cy="3169731"/>
+            <a:chOff x="7943078" y="3255215"/>
+            <a:chExt cx="3452867" cy="3169731"/>
+          </a:xfrm>
+        </p:grpSpPr>
+        <p:pic>
+          <p:nvPicPr>
+            <p:cNvPr id="52" name="Gráfico 51">
+              <a:extLst>
+                <a:ext uri="{FF2B5EF4-FFF2-40B4-BE49-F238E27FC236}">
+                  <a16:creationId xmlns:a16="http://schemas.microsoft.com/office/drawing/2014/main" id="{E46EEDD0-C03E-45E7-AAA2-6CD4002B075F}"/>
+                </a:ext>
+              </a:extLst>
+            </p:cNvPr>
+            <p:cNvPicPr>
+              <a:picLocks noChangeAspect="1"/>
+            </p:cNvPicPr>
+            <p:nvPr/>
+          </p:nvPicPr>
+          <p:blipFill>
+            <a:blip r:embed="rId10">
+              <a:extLst>
+                <a:ext uri="{96DAC541-7B7A-43D3-8B79-37D633B846F1}">
+                  <asvg:svgBlip xmlns:asvg="http://schemas.microsoft.com/office/drawing/2016/SVG/main" r:embed="rId11"/>
+                </a:ext>
+              </a:extLst>
+            </a:blip>
+            <a:stretch>
+              <a:fillRect/>
+            </a:stretch>
+          </p:blipFill>
+          <p:spPr>
+            <a:xfrm rot="713032">
+              <a:off x="7943078" y="3255215"/>
+              <a:ext cx="3452867" cy="3169731"/>
+            </a:xfrm>
+            <a:prstGeom prst="rect">
+              <a:avLst/>
+            </a:prstGeom>
+          </p:spPr>
+        </p:pic>
+        <p:sp>
+          <p:nvSpPr>
+            <p:cNvPr id="53" name="CaixaDeTexto 52">
+              <a:extLst>
+                <a:ext uri="{FF2B5EF4-FFF2-40B4-BE49-F238E27FC236}">
+                  <a16:creationId xmlns:a16="http://schemas.microsoft.com/office/drawing/2014/main" id="{B85497A4-770F-4838-ACDC-9D0BF6F812F8}"/>
+                </a:ext>
+              </a:extLst>
+            </p:cNvPr>
+            <p:cNvSpPr txBox="1"/>
+            <p:nvPr/>
+          </p:nvSpPr>
+          <p:spPr>
+            <a:xfrm rot="657640">
+              <a:off x="8462163" y="3550585"/>
+              <a:ext cx="2752387" cy="2308324"/>
+            </a:xfrm>
+            <a:prstGeom prst="rect">
+              <a:avLst/>
+            </a:prstGeom>
+            <a:noFill/>
+          </p:spPr>
+          <p:txBody>
+            <a:bodyPr wrap="square" rtlCol="0">
+              <a:spAutoFit/>
+            </a:bodyPr>
+            <a:lstStyle/>
+            <a:p>
+              <a:r>
+                <a:rPr lang="pt-BR" b="1" dirty="0">
+                  <a:solidFill>
+                    <a:srgbClr val="000000"/>
+                  </a:solidFill>
+                  <a:latin typeface="Century" panose="02040604050505020304" pitchFamily="18" charset="0"/>
+                  <a:ea typeface="Calibri" panose="020F0502020204030204" pitchFamily="34" charset="0"/>
+                  <a:cs typeface="Calibri" panose="020F0502020204030204" pitchFamily="34" charset="0"/>
+                </a:rPr>
+                <a:t>No </a:t>
+              </a:r>
+              <a:r>
+                <a:rPr lang="pt-BR" sz="1800" b="1" dirty="0">
+                  <a:solidFill>
+                    <a:srgbClr val="000000"/>
+                  </a:solidFill>
+                  <a:effectLst/>
+                  <a:latin typeface="Century" panose="02040604050505020304" pitchFamily="18" charset="0"/>
+                  <a:ea typeface="Calibri" panose="020F0502020204030204" pitchFamily="34" charset="0"/>
+                  <a:cs typeface="Calibri" panose="020F0502020204030204" pitchFamily="34" charset="0"/>
+                </a:rPr>
+                <a:t>ano de 2019 as notas da prova do Saeb teve o menor avanço histórico no ensino fundamental, um crescimento de apenas 0.1 ponto percentual em relação a avaliação em 2017.</a:t>
+              </a:r>
+              <a:endParaRPr lang="pt-BR" sz="1800" b="1" dirty="0">
+                <a:effectLst/>
+                <a:latin typeface="Century" panose="02040604050505020304" pitchFamily="18" charset="0"/>
+                <a:ea typeface="Calibri" panose="020F0502020204030204" pitchFamily="34" charset="0"/>
+                <a:cs typeface="Times New Roman" panose="02020603050405020304" pitchFamily="18" charset="0"/>
+              </a:endParaRPr>
+            </a:p>
+          </p:txBody>
+        </p:sp>
+      </p:grpSp>
     </p:spTree>
     <p:extLst>
       <p:ext uri="{BB962C8B-B14F-4D97-AF65-F5344CB8AC3E}">
@@ -16173,6 +17231,87 @@
                                   </p:childTnLst>
                                 </p:cTn>
                               </p:par>
+                              <p:par>
+                                <p:cTn id="16" presetID="42" presetClass="entr" presetSubtype="0" fill="hold" nodeType="withEffect">
+                                  <p:stCondLst>
+                                    <p:cond delay="250"/>
+                                  </p:stCondLst>
+                                  <p:childTnLst>
+                                    <p:set>
+                                      <p:cBhvr>
+                                        <p:cTn id="17" dur="1" fill="hold">
+                                          <p:stCondLst>
+                                            <p:cond delay="0"/>
+                                          </p:stCondLst>
+                                        </p:cTn>
+                                        <p:tgtEl>
+                                          <p:spTgt spid="5"/>
+                                        </p:tgtEl>
+                                        <p:attrNameLst>
+                                          <p:attrName>style.visibility</p:attrName>
+                                        </p:attrNameLst>
+                                      </p:cBhvr>
+                                      <p:to>
+                                        <p:strVal val="visible"/>
+                                      </p:to>
+                                    </p:set>
+                                    <p:animEffect transition="in" filter="fade">
+                                      <p:cBhvr>
+                                        <p:cTn id="18" dur="1000"/>
+                                        <p:tgtEl>
+                                          <p:spTgt spid="5"/>
+                                        </p:tgtEl>
+                                      </p:cBhvr>
+                                    </p:animEffect>
+                                    <p:anim calcmode="lin" valueType="num">
+                                      <p:cBhvr>
+                                        <p:cTn id="19" dur="1000" fill="hold"/>
+                                        <p:tgtEl>
+                                          <p:spTgt spid="5"/>
+                                        </p:tgtEl>
+                                        <p:attrNameLst>
+                                          <p:attrName>ppt_x</p:attrName>
+                                        </p:attrNameLst>
+                                      </p:cBhvr>
+                                      <p:tavLst>
+                                        <p:tav tm="0">
+                                          <p:val>
+                                            <p:strVal val="#ppt_x"/>
+                                          </p:val>
+                                        </p:tav>
+                                        <p:tav tm="100000">
+                                          <p:val>
+                                            <p:strVal val="#ppt_x"/>
+                                          </p:val>
+                                        </p:tav>
+                                      </p:tavLst>
+                                    </p:anim>
+                                    <p:anim calcmode="lin" valueType="num">
+                                      <p:cBhvr>
+                                        <p:cTn id="20" dur="1000" fill="hold"/>
+                                        <p:tgtEl>
+                                          <p:spTgt spid="5"/>
+                                        </p:tgtEl>
+                                        <p:attrNameLst>
+                                          <p:attrName>ppt_y</p:attrName>
+                                        </p:attrNameLst>
+                                      </p:cBhvr>
+                                      <p:tavLst>
+                                        <p:tav tm="0">
+                                          <p:val>
+                                            <p:strVal val="#ppt_y+.1"/>
+                                          </p:val>
+                                        </p:tav>
+                                        <p:tav tm="100000">
+                                          <p:val>
+                                            <p:strVal val="#ppt_y"/>
+                                          </p:val>
+                                        </p:tav>
+                                      </p:tavLst>
+                                    </p:anim>
+                                  </p:childTnLst>
+                                </p:cTn>
+                              </p:par>
                             </p:childTnLst>
                           </p:cTn>
                         </p:par>
@@ -16207,7 +17346,7 @@
 </p:sld>
 </file>
 
-<file path=ppt/slides/slide13.xml><?xml version="1.0" encoding="utf-8"?>
+<file path=ppt/slides/slide14.xml><?xml version="1.0" encoding="utf-8"?>
 <p:sld xmlns:a="http://schemas.openxmlformats.org/drawingml/2006/main" xmlns:r="http://schemas.openxmlformats.org/officeDocument/2006/relationships" xmlns:p="http://schemas.openxmlformats.org/presentationml/2006/main">
   <p:cSld>
     <p:spTree>
@@ -16676,6 +17815,116 @@
           </a:extLst>
         </p:spPr>
       </p:pic>
+      <p:grpSp>
+        <p:nvGrpSpPr>
+          <p:cNvPr id="11" name="Agrupar 10">
+            <a:extLst>
+              <a:ext uri="{FF2B5EF4-FFF2-40B4-BE49-F238E27FC236}">
+                <a16:creationId xmlns:a16="http://schemas.microsoft.com/office/drawing/2014/main" id="{943DF738-F6DD-415E-986A-193A7F9E218E}"/>
+              </a:ext>
+            </a:extLst>
+          </p:cNvPr>
+          <p:cNvGrpSpPr/>
+          <p:nvPr/>
+        </p:nvGrpSpPr>
+        <p:grpSpPr>
+          <a:xfrm>
+            <a:off x="524511" y="3381856"/>
+            <a:ext cx="3419466" cy="2753007"/>
+            <a:chOff x="524511" y="3381856"/>
+            <a:chExt cx="3419466" cy="2753007"/>
+          </a:xfrm>
+        </p:grpSpPr>
+        <p:pic>
+          <p:nvPicPr>
+            <p:cNvPr id="17" name="Gráfico 16">
+              <a:extLst>
+                <a:ext uri="{FF2B5EF4-FFF2-40B4-BE49-F238E27FC236}">
+                  <a16:creationId xmlns:a16="http://schemas.microsoft.com/office/drawing/2014/main" id="{65F53BA0-41B4-42AA-B72D-C6BA2203CAA1}"/>
+                </a:ext>
+              </a:extLst>
+            </p:cNvPr>
+            <p:cNvPicPr>
+              <a:picLocks noChangeAspect="1"/>
+            </p:cNvPicPr>
+            <p:nvPr/>
+          </p:nvPicPr>
+          <p:blipFill>
+            <a:blip r:embed="rId13">
+              <a:extLst>
+                <a:ext uri="{96DAC541-7B7A-43D3-8B79-37D633B846F1}">
+                  <asvg:svgBlip xmlns:asvg="http://schemas.microsoft.com/office/drawing/2016/SVG/main" r:embed="rId14"/>
+                </a:ext>
+              </a:extLst>
+            </a:blip>
+            <a:stretch>
+              <a:fillRect/>
+            </a:stretch>
+          </p:blipFill>
+          <p:spPr>
+            <a:xfrm rot="21093994">
+              <a:off x="1268520" y="3381856"/>
+              <a:ext cx="2675457" cy="2753007"/>
+            </a:xfrm>
+            <a:prstGeom prst="rect">
+              <a:avLst/>
+            </a:prstGeom>
+          </p:spPr>
+        </p:pic>
+        <p:sp>
+          <p:nvSpPr>
+            <p:cNvPr id="18" name="CaixaDeTexto 17">
+              <a:extLst>
+                <a:ext uri="{FF2B5EF4-FFF2-40B4-BE49-F238E27FC236}">
+                  <a16:creationId xmlns:a16="http://schemas.microsoft.com/office/drawing/2014/main" id="{B5DD69C9-E23B-49AE-8B79-293A2B759FEF}"/>
+                </a:ext>
+              </a:extLst>
+            </p:cNvPr>
+            <p:cNvSpPr txBox="1"/>
+            <p:nvPr/>
+          </p:nvSpPr>
+          <p:spPr>
+            <a:xfrm>
+              <a:off x="524511" y="3767206"/>
+              <a:ext cx="3231166" cy="1846211"/>
+            </a:xfrm>
+            <a:prstGeom prst="rect">
+              <a:avLst/>
+            </a:prstGeom>
+            <a:noFill/>
+          </p:spPr>
+          <p:txBody>
+            <a:bodyPr wrap="square" rtlCol="0">
+              <a:spAutoFit/>
+            </a:bodyPr>
+            <a:lstStyle/>
+            <a:p>
+              <a:pPr marL="899160">
+                <a:lnSpc>
+                  <a:spcPct val="107000"/>
+                </a:lnSpc>
+                <a:spcAft>
+                  <a:spcPts val="800"/>
+                </a:spcAft>
+              </a:pPr>
+              <a:r>
+                <a:rPr lang="pt-BR" dirty="0">
+                  <a:latin typeface="Century" panose="02040604050505020304" pitchFamily="18" charset="0"/>
+                  <a:ea typeface="Calibri" panose="020F0502020204030204" pitchFamily="34" charset="0"/>
+                  <a:cs typeface="Times New Roman" panose="02020603050405020304" pitchFamily="18" charset="0"/>
+                </a:rPr>
+                <a:t>Um projeto de monitoria em Recife comprovou que o método ajuda na vida educacional do  aluno.</a:t>
+              </a:r>
+              <a:endParaRPr lang="pt-BR" sz="1800" dirty="0">
+                <a:effectLst/>
+                <a:latin typeface="Century" panose="02040604050505020304" pitchFamily="18" charset="0"/>
+                <a:ea typeface="Calibri" panose="020F0502020204030204" pitchFamily="34" charset="0"/>
+                <a:cs typeface="Times New Roman" panose="02020603050405020304" pitchFamily="18" charset="0"/>
+              </a:endParaRPr>
+            </a:p>
+          </p:txBody>
+        </p:sp>
+      </p:grpSp>
     </p:spTree>
     <p:extLst>
       <p:ext uri="{BB962C8B-B14F-4D97-AF65-F5344CB8AC3E}">
@@ -16972,657 +18221,21 @@
                                   </p:childTnLst>
                                 </p:cTn>
                               </p:par>
-                            </p:childTnLst>
-                          </p:cTn>
-                        </p:par>
-                      </p:childTnLst>
-                    </p:cTn>
-                  </p:par>
-                </p:childTnLst>
-              </p:cTn>
-              <p:prevCondLst>
-                <p:cond evt="onPrev" delay="0">
-                  <p:tgtEl>
-                    <p:sldTgt/>
-                  </p:tgtEl>
-                </p:cond>
-              </p:prevCondLst>
-              <p:nextCondLst>
-                <p:cond evt="onNext" delay="0">
-                  <p:tgtEl>
-                    <p:sldTgt/>
-                  </p:tgtEl>
-                </p:cond>
-              </p:nextCondLst>
-            </p:seq>
-          </p:childTnLst>
-        </p:cTn>
-      </p:par>
-    </p:tnLst>
-    <p:bldLst>
-      <p:bldP spid="2" grpId="0"/>
-      <p:bldP spid="4" grpId="0"/>
-    </p:bldLst>
-  </p:timing>
-</p:sld>
-</file>
-
-<file path=ppt/slides/slide14.xml><?xml version="1.0" encoding="utf-8"?>
-<p:sld xmlns:a="http://schemas.openxmlformats.org/drawingml/2006/main" xmlns:r="http://schemas.openxmlformats.org/officeDocument/2006/relationships" xmlns:p="http://schemas.openxmlformats.org/presentationml/2006/main">
-  <p:cSld>
-    <p:spTree>
-      <p:nvGrpSpPr>
-        <p:cNvPr id="1" name=""/>
-        <p:cNvGrpSpPr/>
-        <p:nvPr/>
-      </p:nvGrpSpPr>
-      <p:grpSpPr>
-        <a:xfrm>
-          <a:off x="0" y="0"/>
-          <a:ext cx="0" cy="0"/>
-          <a:chOff x="0" y="0"/>
-          <a:chExt cx="0" cy="0"/>
-        </a:xfrm>
-      </p:grpSpPr>
-      <p:sp>
-        <p:nvSpPr>
-          <p:cNvPr id="2" name="Título 1">
-            <a:extLst>
-              <a:ext uri="{FF2B5EF4-FFF2-40B4-BE49-F238E27FC236}">
-                <a16:creationId xmlns:a16="http://schemas.microsoft.com/office/drawing/2014/main" id="{FA69FA04-D0D3-4B04-A9F1-8023C785649F}"/>
-              </a:ext>
-            </a:extLst>
-          </p:cNvPr>
-          <p:cNvSpPr>
-            <a:spLocks noGrp="1"/>
-          </p:cNvSpPr>
-          <p:nvPr>
-            <p:ph type="title"/>
-          </p:nvPr>
-        </p:nvSpPr>
-        <p:spPr/>
-        <p:txBody>
-          <a:bodyPr>
-            <a:normAutofit/>
-          </a:bodyPr>
-          <a:lstStyle/>
-          <a:p>
-            <a:r>
-              <a:rPr lang="pt-BR" sz="2300" b="1" dirty="0">
-                <a:latin typeface="Arial" panose="020B0604020202020204" pitchFamily="34" charset="0"/>
-                <a:cs typeface="Arial" panose="020B0604020202020204" pitchFamily="34" charset="0"/>
-              </a:rPr>
-              <a:t>Justificativa</a:t>
-            </a:r>
-          </a:p>
-        </p:txBody>
-      </p:sp>
-      <p:sp>
-        <p:nvSpPr>
-          <p:cNvPr id="4" name="CaixaDeTexto 3">
-            <a:extLst>
-              <a:ext uri="{FF2B5EF4-FFF2-40B4-BE49-F238E27FC236}">
-                <a16:creationId xmlns:a16="http://schemas.microsoft.com/office/drawing/2014/main" id="{F1F82824-081C-4CE5-A14A-6834E35D1FDE}"/>
-              </a:ext>
-            </a:extLst>
-          </p:cNvPr>
-          <p:cNvSpPr txBox="1"/>
-          <p:nvPr/>
-        </p:nvSpPr>
-        <p:spPr>
-          <a:xfrm>
-            <a:off x="5069839" y="1702778"/>
-            <a:ext cx="6675539" cy="1200329"/>
-          </a:xfrm>
-          <a:prstGeom prst="rect">
-            <a:avLst/>
-          </a:prstGeom>
-          <a:noFill/>
-        </p:spPr>
-        <p:txBody>
-          <a:bodyPr wrap="square">
-            <a:spAutoFit/>
-          </a:bodyPr>
-          <a:lstStyle/>
-          <a:p>
-            <a:r>
-              <a:rPr lang="pt-BR" sz="1800" dirty="0">
-                <a:solidFill>
-                  <a:srgbClr val="837E7E"/>
-                </a:solidFill>
-                <a:latin typeface="Arial" panose="020B0604020202020204" pitchFamily="34" charset="0"/>
-                <a:cs typeface="Arial" panose="020B0604020202020204" pitchFamily="34" charset="0"/>
-              </a:rPr>
-              <a:t>Atualmente a desistência no ensino superior vem se elevando, sendo o reflexo do ensino fundamental, com um número alto de evasão, e piorando os números em relação a matéria de matemática que envolve a lógica do aluno.</a:t>
-            </a:r>
-          </a:p>
-        </p:txBody>
-      </p:sp>
-      <p:pic>
-        <p:nvPicPr>
-          <p:cNvPr id="5" name="Picture 4" descr="Key West Web Design">
-            <a:extLst>
-              <a:ext uri="{FF2B5EF4-FFF2-40B4-BE49-F238E27FC236}">
-                <a16:creationId xmlns:a16="http://schemas.microsoft.com/office/drawing/2014/main" id="{C0F2981F-E1B4-4CDB-953A-3527F0919FD1}"/>
-              </a:ext>
-            </a:extLst>
-          </p:cNvPr>
-          <p:cNvPicPr>
-            <a:picLocks noChangeAspect="1" noChangeArrowheads="1"/>
-          </p:cNvPicPr>
-          <p:nvPr/>
-        </p:nvPicPr>
-        <p:blipFill>
-          <a:blip r:embed="rId3">
-            <a:extLst>
-              <a:ext uri="{28A0092B-C50C-407E-A947-70E740481C1C}">
-                <a14:useLocalDpi xmlns:a14="http://schemas.microsoft.com/office/drawing/2010/main" val="0"/>
-              </a:ext>
-            </a:extLst>
-          </a:blip>
-          <a:srcRect/>
-          <a:stretch>
-            <a:fillRect/>
-          </a:stretch>
-        </p:blipFill>
-        <p:spPr bwMode="auto">
-          <a:xfrm>
-            <a:off x="-5958665" y="4017443"/>
-            <a:ext cx="8780463" cy="6858000"/>
-          </a:xfrm>
-          <a:prstGeom prst="rect">
-            <a:avLst/>
-          </a:prstGeom>
-          <a:noFill/>
-          <a:extLst>
-            <a:ext uri="{909E8E84-426E-40DD-AFC4-6F175D3DCCD1}">
-              <a14:hiddenFill xmlns:a14="http://schemas.microsoft.com/office/drawing/2010/main">
-                <a:solidFill>
-                  <a:srgbClr val="FFFFFF"/>
-                </a:solidFill>
-              </a14:hiddenFill>
-            </a:ext>
-          </a:extLst>
-        </p:spPr>
-      </p:pic>
-      <p:pic>
-        <p:nvPicPr>
-          <p:cNvPr id="6" name="Picture 4" descr="Key West Web Design">
-            <a:extLst>
-              <a:ext uri="{FF2B5EF4-FFF2-40B4-BE49-F238E27FC236}">
-                <a16:creationId xmlns:a16="http://schemas.microsoft.com/office/drawing/2014/main" id="{6774D9D7-F50C-4630-85EA-56BD19A769C8}"/>
-              </a:ext>
-            </a:extLst>
-          </p:cNvPr>
-          <p:cNvPicPr>
-            <a:picLocks noChangeAspect="1" noChangeArrowheads="1"/>
-          </p:cNvPicPr>
-          <p:nvPr/>
-        </p:nvPicPr>
-        <p:blipFill>
-          <a:blip r:embed="rId3">
-            <a:extLst>
-              <a:ext uri="{28A0092B-C50C-407E-A947-70E740481C1C}">
-                <a14:useLocalDpi xmlns:a14="http://schemas.microsoft.com/office/drawing/2010/main" val="0"/>
-              </a:ext>
-            </a:extLst>
-          </a:blip>
-          <a:srcRect/>
-          <a:stretch>
-            <a:fillRect/>
-          </a:stretch>
-        </p:blipFill>
-        <p:spPr bwMode="auto">
-          <a:xfrm>
-            <a:off x="9912625" y="-4555057"/>
-            <a:ext cx="8780463" cy="6858000"/>
-          </a:xfrm>
-          <a:prstGeom prst="rect">
-            <a:avLst/>
-          </a:prstGeom>
-          <a:noFill/>
-          <a:extLst>
-            <a:ext uri="{909E8E84-426E-40DD-AFC4-6F175D3DCCD1}">
-              <a14:hiddenFill xmlns:a14="http://schemas.microsoft.com/office/drawing/2010/main">
-                <a:solidFill>
-                  <a:srgbClr val="FFFFFF"/>
-                </a:solidFill>
-              </a14:hiddenFill>
-            </a:ext>
-          </a:extLst>
-        </p:spPr>
-      </p:pic>
-      <p:grpSp>
-        <p:nvGrpSpPr>
-          <p:cNvPr id="3" name="Agrupar 2">
-            <a:extLst>
-              <a:ext uri="{FF2B5EF4-FFF2-40B4-BE49-F238E27FC236}">
-                <a16:creationId xmlns:a16="http://schemas.microsoft.com/office/drawing/2014/main" id="{E7FF23A7-EABD-4B91-9409-6F19041163E5}"/>
-              </a:ext>
-            </a:extLst>
-          </p:cNvPr>
-          <p:cNvGrpSpPr/>
-          <p:nvPr/>
-        </p:nvGrpSpPr>
-        <p:grpSpPr>
-          <a:xfrm>
-            <a:off x="1278747" y="2168111"/>
-            <a:ext cx="3086100" cy="2686050"/>
-            <a:chOff x="1278747" y="2168111"/>
-            <a:chExt cx="3086100" cy="2686050"/>
-          </a:xfrm>
-        </p:grpSpPr>
-        <p:pic>
-          <p:nvPicPr>
-            <p:cNvPr id="8" name="Gráfico 7">
-              <a:extLst>
-                <a:ext uri="{FF2B5EF4-FFF2-40B4-BE49-F238E27FC236}">
-                  <a16:creationId xmlns:a16="http://schemas.microsoft.com/office/drawing/2014/main" id="{1D4A2140-E547-40A2-8A9E-0FB6196354AD}"/>
-                </a:ext>
-              </a:extLst>
-            </p:cNvPr>
-            <p:cNvPicPr>
-              <a:picLocks noChangeAspect="1"/>
-            </p:cNvPicPr>
-            <p:nvPr/>
-          </p:nvPicPr>
-          <p:blipFill>
-            <a:blip r:embed="rId4">
-              <a:extLst>
-                <a:ext uri="{96DAC541-7B7A-43D3-8B79-37D633B846F1}">
-                  <asvg:svgBlip xmlns:asvg="http://schemas.microsoft.com/office/drawing/2016/SVG/main" r:embed="rId5"/>
-                </a:ext>
-              </a:extLst>
-            </a:blip>
-            <a:stretch>
-              <a:fillRect/>
-            </a:stretch>
-          </p:blipFill>
-          <p:spPr>
-            <a:xfrm>
-              <a:off x="1278747" y="2168111"/>
-              <a:ext cx="3086100" cy="2686050"/>
-            </a:xfrm>
-            <a:prstGeom prst="rect">
-              <a:avLst/>
-            </a:prstGeom>
-          </p:spPr>
-        </p:pic>
-        <p:sp>
-          <p:nvSpPr>
-            <p:cNvPr id="10" name="CaixaDeTexto 9">
-              <a:extLst>
-                <a:ext uri="{FF2B5EF4-FFF2-40B4-BE49-F238E27FC236}">
-                  <a16:creationId xmlns:a16="http://schemas.microsoft.com/office/drawing/2014/main" id="{53F9D72B-D84F-459F-A427-AB2292E34731}"/>
-                </a:ext>
-              </a:extLst>
-            </p:cNvPr>
-            <p:cNvSpPr txBox="1"/>
-            <p:nvPr/>
-          </p:nvSpPr>
-          <p:spPr>
-            <a:xfrm>
-              <a:off x="1837427" y="2413337"/>
-              <a:ext cx="2173856" cy="2031325"/>
-            </a:xfrm>
-            <a:prstGeom prst="rect">
-              <a:avLst/>
-            </a:prstGeom>
-            <a:noFill/>
-          </p:spPr>
-          <p:txBody>
-            <a:bodyPr wrap="square" rtlCol="0">
-              <a:spAutoFit/>
-            </a:bodyPr>
-            <a:lstStyle/>
-            <a:p>
-              <a:r>
-                <a:rPr lang="pt-BR" dirty="0">
-                  <a:latin typeface="Century" panose="02040604050505020304" pitchFamily="18" charset="0"/>
-                  <a:cs typeface="Aharoni" panose="02010803020104030203" pitchFamily="2" charset="-79"/>
-                </a:rPr>
-                <a:t>Em </a:t>
-              </a:r>
-              <a:r>
-                <a:rPr lang="pt-BR" sz="2000" dirty="0">
-                  <a:latin typeface="Century" panose="02040604050505020304" pitchFamily="18" charset="0"/>
-                  <a:cs typeface="Aharoni" panose="02010803020104030203" pitchFamily="2" charset="-79"/>
-                </a:rPr>
-                <a:t>2019</a:t>
-              </a:r>
-              <a:r>
-                <a:rPr lang="pt-BR" dirty="0">
-                  <a:latin typeface="Century" panose="02040604050505020304" pitchFamily="18" charset="0"/>
-                  <a:cs typeface="Aharoni" panose="02010803020104030203" pitchFamily="2" charset="-79"/>
-                </a:rPr>
-                <a:t> de </a:t>
-              </a:r>
-              <a:r>
-                <a:rPr lang="pt-BR" sz="2400" dirty="0">
-                  <a:solidFill>
-                    <a:schemeClr val="accent1"/>
-                  </a:solidFill>
-                  <a:latin typeface="Century" panose="02040604050505020304" pitchFamily="18" charset="0"/>
-                  <a:cs typeface="Aharoni" panose="02010803020104030203" pitchFamily="2" charset="-79"/>
-                </a:rPr>
-                <a:t>1,2</a:t>
-              </a:r>
-              <a:r>
-                <a:rPr lang="pt-BR" dirty="0">
-                  <a:solidFill>
-                    <a:schemeClr val="accent1"/>
-                  </a:solidFill>
-                  <a:latin typeface="Century" panose="02040604050505020304" pitchFamily="18" charset="0"/>
-                  <a:cs typeface="Aharoni" panose="02010803020104030203" pitchFamily="2" charset="-79"/>
-                </a:rPr>
-                <a:t> </a:t>
-              </a:r>
-              <a:r>
-                <a:rPr lang="pt-BR" sz="2400" dirty="0">
-                  <a:solidFill>
-                    <a:schemeClr val="accent1"/>
-                  </a:solidFill>
-                  <a:latin typeface="Century" panose="02040604050505020304" pitchFamily="18" charset="0"/>
-                  <a:cs typeface="Aharoni" panose="02010803020104030203" pitchFamily="2" charset="-79"/>
-                </a:rPr>
-                <a:t>milhões</a:t>
-              </a:r>
-              <a:r>
-                <a:rPr lang="pt-BR" dirty="0">
-                  <a:solidFill>
-                    <a:schemeClr val="accent1"/>
-                  </a:solidFill>
-                  <a:latin typeface="Century" panose="02040604050505020304" pitchFamily="18" charset="0"/>
-                  <a:cs typeface="Aharoni" panose="02010803020104030203" pitchFamily="2" charset="-79"/>
-                </a:rPr>
-                <a:t> </a:t>
-              </a:r>
-              <a:r>
-                <a:rPr lang="pt-BR" dirty="0">
-                  <a:latin typeface="Century" panose="02040604050505020304" pitchFamily="18" charset="0"/>
-                  <a:cs typeface="Aharoni" panose="02010803020104030203" pitchFamily="2" charset="-79"/>
-                </a:rPr>
-                <a:t>de estudantes somente </a:t>
-              </a:r>
-              <a:r>
-                <a:rPr lang="pt-BR" sz="2400" dirty="0">
-                  <a:solidFill>
-                    <a:srgbClr val="FF0000"/>
-                  </a:solidFill>
-                  <a:latin typeface="Century" panose="02040604050505020304" pitchFamily="18" charset="0"/>
-                  <a:cs typeface="Aharoni" panose="02010803020104030203" pitchFamily="2" charset="-79"/>
-                </a:rPr>
-                <a:t>14</a:t>
-              </a:r>
-              <a:r>
-                <a:rPr lang="pt-BR" dirty="0">
-                  <a:solidFill>
-                    <a:srgbClr val="FF0000"/>
-                  </a:solidFill>
-                  <a:latin typeface="Century" panose="02040604050505020304" pitchFamily="18" charset="0"/>
-                  <a:cs typeface="Aharoni" panose="02010803020104030203" pitchFamily="2" charset="-79"/>
-                </a:rPr>
-                <a:t> </a:t>
-              </a:r>
-              <a:r>
-                <a:rPr lang="pt-BR" sz="2400" dirty="0">
-                  <a:solidFill>
-                    <a:srgbClr val="FF0000"/>
-                  </a:solidFill>
-                  <a:latin typeface="Century" panose="02040604050505020304" pitchFamily="18" charset="0"/>
-                  <a:cs typeface="Aharoni" panose="02010803020104030203" pitchFamily="2" charset="-79"/>
-                </a:rPr>
-                <a:t>mil </a:t>
-              </a:r>
-              <a:r>
-                <a:rPr lang="pt-BR" dirty="0">
-                  <a:latin typeface="Century" panose="02040604050505020304" pitchFamily="18" charset="0"/>
-                  <a:cs typeface="Aharoni" panose="02010803020104030203" pitchFamily="2" charset="-79"/>
-                </a:rPr>
-                <a:t>terminaram a graduação</a:t>
-              </a:r>
-            </a:p>
-          </p:txBody>
-        </p:sp>
-      </p:grpSp>
-      <p:pic>
-        <p:nvPicPr>
-          <p:cNvPr id="14" name="Gráfico 13">
-            <a:extLst>
-              <a:ext uri="{FF2B5EF4-FFF2-40B4-BE49-F238E27FC236}">
-                <a16:creationId xmlns:a16="http://schemas.microsoft.com/office/drawing/2014/main" id="{1EB1CF3C-4E5A-4E5D-9FE5-FE6EE12F7EB3}"/>
-              </a:ext>
-            </a:extLst>
-          </p:cNvPr>
-          <p:cNvPicPr>
-            <a:picLocks noChangeAspect="1"/>
-          </p:cNvPicPr>
-          <p:nvPr/>
-        </p:nvPicPr>
-        <p:blipFill>
-          <a:blip r:embed="rId6">
-            <a:extLst>
-              <a:ext uri="{96DAC541-7B7A-43D3-8B79-37D633B846F1}">
-                <asvg:svgBlip xmlns:asvg="http://schemas.microsoft.com/office/drawing/2016/SVG/main" r:embed="rId7"/>
-              </a:ext>
-            </a:extLst>
-          </a:blip>
-          <a:stretch>
-            <a:fillRect/>
-          </a:stretch>
-        </p:blipFill>
-        <p:spPr>
-          <a:xfrm flipH="1">
-            <a:off x="9056310" y="4125654"/>
-            <a:ext cx="2865138" cy="2485216"/>
-          </a:xfrm>
-          <a:prstGeom prst="rect">
-            <a:avLst/>
-          </a:prstGeom>
-        </p:spPr>
-      </p:pic>
-      <p:pic>
-        <p:nvPicPr>
-          <p:cNvPr id="22" name="Gráfico 21">
-            <a:extLst>
-              <a:ext uri="{FF2B5EF4-FFF2-40B4-BE49-F238E27FC236}">
-                <a16:creationId xmlns:a16="http://schemas.microsoft.com/office/drawing/2014/main" id="{BCB9E001-2441-4653-9A0E-01A90E27648D}"/>
-              </a:ext>
-            </a:extLst>
-          </p:cNvPr>
-          <p:cNvPicPr>
-            <a:picLocks noChangeAspect="1"/>
-          </p:cNvPicPr>
-          <p:nvPr/>
-        </p:nvPicPr>
-        <p:blipFill>
-          <a:blip r:embed="rId8">
-            <a:extLst>
-              <a:ext uri="{96DAC541-7B7A-43D3-8B79-37D633B846F1}">
-                <asvg:svgBlip xmlns:asvg="http://schemas.microsoft.com/office/drawing/2016/SVG/main" r:embed="rId9"/>
-              </a:ext>
-            </a:extLst>
-          </a:blip>
-          <a:stretch>
-            <a:fillRect/>
-          </a:stretch>
-        </p:blipFill>
-        <p:spPr>
-          <a:xfrm>
-            <a:off x="5632781" y="3437810"/>
-            <a:ext cx="3760960" cy="2398355"/>
-          </a:xfrm>
-          <a:prstGeom prst="rect">
-            <a:avLst/>
-          </a:prstGeom>
-        </p:spPr>
-      </p:pic>
-      <p:sp>
-        <p:nvSpPr>
-          <p:cNvPr id="24" name="CaixaDeTexto 23">
-            <a:extLst>
-              <a:ext uri="{FF2B5EF4-FFF2-40B4-BE49-F238E27FC236}">
-                <a16:creationId xmlns:a16="http://schemas.microsoft.com/office/drawing/2014/main" id="{0C97E24D-7090-454A-88ED-364890F3B736}"/>
-              </a:ext>
-            </a:extLst>
-          </p:cNvPr>
-          <p:cNvSpPr txBox="1"/>
-          <p:nvPr/>
-        </p:nvSpPr>
-        <p:spPr>
-          <a:xfrm>
-            <a:off x="5747912" y="3493229"/>
-            <a:ext cx="3530697" cy="1661993"/>
-          </a:xfrm>
-          <a:prstGeom prst="rect">
-            <a:avLst/>
-          </a:prstGeom>
-          <a:noFill/>
-        </p:spPr>
-        <p:txBody>
-          <a:bodyPr wrap="square">
-            <a:spAutoFit/>
-          </a:bodyPr>
-          <a:lstStyle/>
-          <a:p>
-            <a:r>
-              <a:rPr lang="pt-BR" sz="1700" dirty="0">
-                <a:latin typeface="Century" panose="02040604050505020304" pitchFamily="18" charset="0"/>
-              </a:rPr>
-              <a:t>Ainda em 2019  as notas da prova do Saeb teve o menor avanço histórico no ensino fundamental, um crescimento de apenas 0.1 ponto percentual em relação a avaliação em 2017.</a:t>
-            </a:r>
-          </a:p>
-        </p:txBody>
-      </p:sp>
-      <p:sp>
-        <p:nvSpPr>
-          <p:cNvPr id="25" name="CaixaDeTexto 24">
-            <a:extLst>
-              <a:ext uri="{FF2B5EF4-FFF2-40B4-BE49-F238E27FC236}">
-                <a16:creationId xmlns:a16="http://schemas.microsoft.com/office/drawing/2014/main" id="{84F1BAEF-4572-4343-88C2-912E216348CD}"/>
-              </a:ext>
-            </a:extLst>
-          </p:cNvPr>
-          <p:cNvSpPr txBox="1"/>
-          <p:nvPr/>
-        </p:nvSpPr>
-        <p:spPr>
-          <a:xfrm flipH="1">
-            <a:off x="3877193" y="6247349"/>
-            <a:ext cx="2799360" cy="276999"/>
-          </a:xfrm>
-          <a:prstGeom prst="rect">
-            <a:avLst/>
-          </a:prstGeom>
-          <a:noFill/>
-        </p:spPr>
-        <p:txBody>
-          <a:bodyPr wrap="square" rtlCol="0">
-            <a:spAutoFit/>
-          </a:bodyPr>
-          <a:lstStyle/>
-          <a:p>
-            <a:r>
-              <a:rPr lang="pt-BR" sz="1200" dirty="0">
-                <a:latin typeface="Century" panose="02040604050505020304" pitchFamily="18" charset="0"/>
-              </a:rPr>
-              <a:t>Fonte https://www.gov.br/inep/pt-br </a:t>
-            </a:r>
-          </a:p>
-        </p:txBody>
-      </p:sp>
-    </p:spTree>
-    <p:extLst>
-      <p:ext uri="{BB962C8B-B14F-4D97-AF65-F5344CB8AC3E}">
-        <p14:creationId xmlns:p14="http://schemas.microsoft.com/office/powerpoint/2010/main" val="1449505509"/>
-      </p:ext>
-    </p:extLst>
-  </p:cSld>
-  <p:clrMapOvr>
-    <a:masterClrMapping/>
-  </p:clrMapOvr>
-  <p:timing>
-    <p:tnLst>
-      <p:par>
-        <p:cTn id="1" dur="indefinite" restart="never" nodeType="tmRoot">
-          <p:childTnLst>
-            <p:seq concurrent="1" nextAc="seek">
-              <p:cTn id="2" dur="indefinite" nodeType="mainSeq">
-                <p:childTnLst>
-                  <p:par>
-                    <p:cTn id="3" fill="hold">
-                      <p:stCondLst>
-                        <p:cond delay="indefinite"/>
-                        <p:cond evt="onBegin" delay="0">
-                          <p:tn val="2"/>
-                        </p:cond>
-                      </p:stCondLst>
-                      <p:childTnLst>
-                        <p:par>
-                          <p:cTn id="4" fill="hold">
-                            <p:stCondLst>
-                              <p:cond delay="0"/>
-                            </p:stCondLst>
-                            <p:childTnLst>
                               <p:par>
-                                <p:cTn id="5" presetID="42" presetClass="path" presetSubtype="0" accel="50000" decel="50000" fill="hold" nodeType="withEffect">
+                                <p:cTn id="24" presetID="42" presetClass="entr" presetSubtype="0" fill="hold" nodeType="withEffect">
                                   <p:stCondLst>
-                                    <p:cond delay="0"/>
-                                  </p:stCondLst>
-                                  <p:childTnLst>
-                                    <p:animMotion origin="layout" path="M -0.14518 0.14792 L -0.05481 0.04861 " pathEditMode="relative" rAng="0" ptsTypes="AA">
-                                      <p:cBhvr>
-                                        <p:cTn id="6" dur="2000" fill="hold"/>
-                                        <p:tgtEl>
-                                          <p:spTgt spid="5"/>
-                                        </p:tgtEl>
-                                        <p:attrNameLst>
-                                          <p:attrName>ppt_x</p:attrName>
-                                          <p:attrName>ppt_y</p:attrName>
-                                        </p:attrNameLst>
-                                      </p:cBhvr>
-                                      <p:rCtr x="4518" y="-4977"/>
-                                    </p:animMotion>
-                                  </p:childTnLst>
-                                </p:cTn>
-                              </p:par>
-                              <p:par>
-                                <p:cTn id="7" presetID="42" presetClass="path" presetSubtype="0" accel="50000" decel="50000" fill="hold" nodeType="withEffect">
-                                  <p:stCondLst>
-                                    <p:cond delay="0"/>
-                                  </p:stCondLst>
-                                  <p:childTnLst>
-                                    <p:animMotion origin="layout" path="M 0.18633 -0.26644 L 3.125E-6 3.7037E-7 " pathEditMode="relative" rAng="0" ptsTypes="AA">
-                                      <p:cBhvr>
-                                        <p:cTn id="8" dur="2000" fill="hold"/>
-                                        <p:tgtEl>
-                                          <p:spTgt spid="6"/>
-                                        </p:tgtEl>
-                                        <p:attrNameLst>
-                                          <p:attrName>ppt_x</p:attrName>
-                                          <p:attrName>ppt_y</p:attrName>
-                                        </p:attrNameLst>
-                                      </p:cBhvr>
-                                      <p:rCtr x="-9323" y="13333"/>
-                                    </p:animMotion>
-                                  </p:childTnLst>
-                                </p:cTn>
-                              </p:par>
-                              <p:par>
-                                <p:cTn id="9" presetID="10" presetClass="entr" presetSubtype="0" fill="hold" nodeType="withEffect">
-                                  <p:stCondLst>
-                                    <p:cond delay="0"/>
+                                    <p:cond delay="250"/>
                                   </p:stCondLst>
                                   <p:childTnLst>
                                     <p:set>
                                       <p:cBhvr>
-                                        <p:cTn id="10" dur="1" fill="hold">
+                                        <p:cTn id="25" dur="1" fill="hold">
                                           <p:stCondLst>
                                             <p:cond delay="0"/>
                                           </p:stCondLst>
                                         </p:cTn>
                                         <p:tgtEl>
-                                          <p:spTgt spid="3"/>
+                                          <p:spTgt spid="11"/>
                                         </p:tgtEl>
                                         <p:attrNameLst>
                                           <p:attrName>style.visibility</p:attrName>
@@ -17634,52 +18247,17 @@
                                     </p:set>
                                     <p:animEffect transition="in" filter="fade">
                                       <p:cBhvr>
-                                        <p:cTn id="11" dur="500"/>
-                                        <p:tgtEl>
-                                          <p:spTgt spid="3"/>
-                                        </p:tgtEl>
-                                      </p:cBhvr>
-                                    </p:animEffect>
-                                  </p:childTnLst>
-                                </p:cTn>
-                              </p:par>
-                              <p:par>
-                                <p:cTn id="12" presetID="42" presetClass="entr" presetSubtype="0" fill="hold" nodeType="withEffect">
-                                  <p:stCondLst>
-                                    <p:cond delay="0"/>
-                                  </p:stCondLst>
-                                  <p:childTnLst>
-                                    <p:set>
-                                      <p:cBhvr>
-                                        <p:cTn id="13" dur="1" fill="hold">
-                                          <p:stCondLst>
-                                            <p:cond delay="0"/>
-                                          </p:stCondLst>
-                                        </p:cTn>
-                                        <p:tgtEl>
-                                          <p:spTgt spid="14"/>
-                                        </p:tgtEl>
-                                        <p:attrNameLst>
-                                          <p:attrName>style.visibility</p:attrName>
-                                        </p:attrNameLst>
-                                      </p:cBhvr>
-                                      <p:to>
-                                        <p:strVal val="visible"/>
-                                      </p:to>
-                                    </p:set>
-                                    <p:animEffect transition="in" filter="fade">
-                                      <p:cBhvr>
-                                        <p:cTn id="14" dur="1000"/>
-                                        <p:tgtEl>
-                                          <p:spTgt spid="14"/>
+                                        <p:cTn id="26" dur="1000"/>
+                                        <p:tgtEl>
+                                          <p:spTgt spid="11"/>
                                         </p:tgtEl>
                                       </p:cBhvr>
                                     </p:animEffect>
                                     <p:anim calcmode="lin" valueType="num">
                                       <p:cBhvr>
-                                        <p:cTn id="15" dur="1000" fill="hold"/>
-                                        <p:tgtEl>
-                                          <p:spTgt spid="14"/>
+                                        <p:cTn id="27" dur="1000" fill="hold"/>
+                                        <p:tgtEl>
+                                          <p:spTgt spid="11"/>
                                         </p:tgtEl>
                                         <p:attrNameLst>
                                           <p:attrName>ppt_x</p:attrName>
@@ -17700,9 +18278,9 @@
                                     </p:anim>
                                     <p:anim calcmode="lin" valueType="num">
                                       <p:cBhvr>
-                                        <p:cTn id="16" dur="1000" fill="hold"/>
-                                        <p:tgtEl>
-                                          <p:spTgt spid="14"/>
+                                        <p:cTn id="28" dur="1000" fill="hold"/>
+                                        <p:tgtEl>
+                                          <p:spTgt spid="11"/>
                                         </p:tgtEl>
                                         <p:attrNameLst>
                                           <p:attrName>ppt_y</p:attrName>
@@ -17721,190 +18299,6 @@
                                         </p:tav>
                                       </p:tavLst>
                                     </p:anim>
-                                  </p:childTnLst>
-                                </p:cTn>
-                              </p:par>
-                              <p:par>
-                                <p:cTn id="17" presetID="42" presetClass="entr" presetSubtype="0" fill="hold" nodeType="withEffect">
-                                  <p:stCondLst>
-                                    <p:cond delay="0"/>
-                                  </p:stCondLst>
-                                  <p:childTnLst>
-                                    <p:set>
-                                      <p:cBhvr>
-                                        <p:cTn id="18" dur="1" fill="hold">
-                                          <p:stCondLst>
-                                            <p:cond delay="0"/>
-                                          </p:stCondLst>
-                                        </p:cTn>
-                                        <p:tgtEl>
-                                          <p:spTgt spid="22"/>
-                                        </p:tgtEl>
-                                        <p:attrNameLst>
-                                          <p:attrName>style.visibility</p:attrName>
-                                        </p:attrNameLst>
-                                      </p:cBhvr>
-                                      <p:to>
-                                        <p:strVal val="visible"/>
-                                      </p:to>
-                                    </p:set>
-                                    <p:animEffect transition="in" filter="fade">
-                                      <p:cBhvr>
-                                        <p:cTn id="19" dur="1000"/>
-                                        <p:tgtEl>
-                                          <p:spTgt spid="22"/>
-                                        </p:tgtEl>
-                                      </p:cBhvr>
-                                    </p:animEffect>
-                                    <p:anim calcmode="lin" valueType="num">
-                                      <p:cBhvr>
-                                        <p:cTn id="20" dur="1000" fill="hold"/>
-                                        <p:tgtEl>
-                                          <p:spTgt spid="22"/>
-                                        </p:tgtEl>
-                                        <p:attrNameLst>
-                                          <p:attrName>ppt_x</p:attrName>
-                                        </p:attrNameLst>
-                                      </p:cBhvr>
-                                      <p:tavLst>
-                                        <p:tav tm="0">
-                                          <p:val>
-                                            <p:strVal val="#ppt_x"/>
-                                          </p:val>
-                                        </p:tav>
-                                        <p:tav tm="100000">
-                                          <p:val>
-                                            <p:strVal val="#ppt_x"/>
-                                          </p:val>
-                                        </p:tav>
-                                      </p:tavLst>
-                                    </p:anim>
-                                    <p:anim calcmode="lin" valueType="num">
-                                      <p:cBhvr>
-                                        <p:cTn id="21" dur="1000" fill="hold"/>
-                                        <p:tgtEl>
-                                          <p:spTgt spid="22"/>
-                                        </p:tgtEl>
-                                        <p:attrNameLst>
-                                          <p:attrName>ppt_y</p:attrName>
-                                        </p:attrNameLst>
-                                      </p:cBhvr>
-                                      <p:tavLst>
-                                        <p:tav tm="0">
-                                          <p:val>
-                                            <p:strVal val="#ppt_y+.1"/>
-                                          </p:val>
-                                        </p:tav>
-                                        <p:tav tm="100000">
-                                          <p:val>
-                                            <p:strVal val="#ppt_y"/>
-                                          </p:val>
-                                        </p:tav>
-                                      </p:tavLst>
-                                    </p:anim>
-                                  </p:childTnLst>
-                                </p:cTn>
-                              </p:par>
-                              <p:par>
-                                <p:cTn id="22" presetID="42" presetClass="entr" presetSubtype="0" fill="hold" grpId="0" nodeType="withEffect">
-                                  <p:stCondLst>
-                                    <p:cond delay="0"/>
-                                  </p:stCondLst>
-                                  <p:childTnLst>
-                                    <p:set>
-                                      <p:cBhvr>
-                                        <p:cTn id="23" dur="1" fill="hold">
-                                          <p:stCondLst>
-                                            <p:cond delay="0"/>
-                                          </p:stCondLst>
-                                        </p:cTn>
-                                        <p:tgtEl>
-                                          <p:spTgt spid="24"/>
-                                        </p:tgtEl>
-                                        <p:attrNameLst>
-                                          <p:attrName>style.visibility</p:attrName>
-                                        </p:attrNameLst>
-                                      </p:cBhvr>
-                                      <p:to>
-                                        <p:strVal val="visible"/>
-                                      </p:to>
-                                    </p:set>
-                                    <p:animEffect transition="in" filter="fade">
-                                      <p:cBhvr>
-                                        <p:cTn id="24" dur="1000"/>
-                                        <p:tgtEl>
-                                          <p:spTgt spid="24"/>
-                                        </p:tgtEl>
-                                      </p:cBhvr>
-                                    </p:animEffect>
-                                    <p:anim calcmode="lin" valueType="num">
-                                      <p:cBhvr>
-                                        <p:cTn id="25" dur="1000" fill="hold"/>
-                                        <p:tgtEl>
-                                          <p:spTgt spid="24"/>
-                                        </p:tgtEl>
-                                        <p:attrNameLst>
-                                          <p:attrName>ppt_x</p:attrName>
-                                        </p:attrNameLst>
-                                      </p:cBhvr>
-                                      <p:tavLst>
-                                        <p:tav tm="0">
-                                          <p:val>
-                                            <p:strVal val="#ppt_x"/>
-                                          </p:val>
-                                        </p:tav>
-                                        <p:tav tm="100000">
-                                          <p:val>
-                                            <p:strVal val="#ppt_x"/>
-                                          </p:val>
-                                        </p:tav>
-                                      </p:tavLst>
-                                    </p:anim>
-                                    <p:anim calcmode="lin" valueType="num">
-                                      <p:cBhvr>
-                                        <p:cTn id="26" dur="1000" fill="hold"/>
-                                        <p:tgtEl>
-                                          <p:spTgt spid="24"/>
-                                        </p:tgtEl>
-                                        <p:attrNameLst>
-                                          <p:attrName>ppt_y</p:attrName>
-                                        </p:attrNameLst>
-                                      </p:cBhvr>
-                                      <p:tavLst>
-                                        <p:tav tm="0">
-                                          <p:val>
-                                            <p:strVal val="#ppt_y+.1"/>
-                                          </p:val>
-                                        </p:tav>
-                                        <p:tav tm="100000">
-                                          <p:val>
-                                            <p:strVal val="#ppt_y"/>
-                                          </p:val>
-                                        </p:tav>
-                                      </p:tavLst>
-                                    </p:anim>
-                                  </p:childTnLst>
-                                </p:cTn>
-                              </p:par>
-                              <p:par>
-                                <p:cTn id="27" presetID="35" presetClass="path" presetSubtype="0" accel="50000" decel="50000" fill="hold" grpId="0" nodeType="withEffect">
-                                  <p:stCondLst>
-                                    <p:cond delay="0"/>
-                                  </p:stCondLst>
-                                  <p:childTnLst>
-                                    <p:animMotion origin="layout" path="M 0.59167 3.7037E-7 L -2.5E-6 3.7037E-7 " pathEditMode="relative" rAng="0" ptsTypes="AA">
-                                      <p:cBhvr>
-                                        <p:cTn id="28" dur="2000" fill="hold"/>
-                                        <p:tgtEl>
-                                          <p:spTgt spid="4"/>
-                                        </p:tgtEl>
-                                        <p:attrNameLst>
-                                          <p:attrName>ppt_x</p:attrName>
-                                          <p:attrName>ppt_y</p:attrName>
-                                        </p:attrNameLst>
-                                      </p:cBhvr>
-                                      <p:rCtr x="-29609" y="0"/>
-                                    </p:animMotion>
                                   </p:childTnLst>
                                 </p:cTn>
                               </p:par>
@@ -17936,8 +18330,8 @@
       </p:par>
     </p:tnLst>
     <p:bldLst>
+      <p:bldP spid="2" grpId="0"/>
       <p:bldP spid="4" grpId="0"/>
-      <p:bldP spid="24" grpId="0"/>
     </p:bldLst>
   </p:timing>
 </p:sld>
@@ -26579,36 +26973,6 @@
           <a:chExt cx="0" cy="0"/>
         </a:xfrm>
       </p:grpSpPr>
-      <p:pic>
-        <p:nvPicPr>
-          <p:cNvPr id="6" name="Imagem 5">
-            <a:extLst>
-              <a:ext uri="{FF2B5EF4-FFF2-40B4-BE49-F238E27FC236}">
-                <a16:creationId xmlns:a16="http://schemas.microsoft.com/office/drawing/2014/main" id="{D03BDE0E-7A4D-4C2C-8A55-30413B5CCAB9}"/>
-              </a:ext>
-            </a:extLst>
-          </p:cNvPr>
-          <p:cNvPicPr>
-            <a:picLocks noChangeAspect="1"/>
-          </p:cNvPicPr>
-          <p:nvPr/>
-        </p:nvPicPr>
-        <p:blipFill>
-          <a:blip r:embed="rId2"/>
-          <a:stretch>
-            <a:fillRect/>
-          </a:stretch>
-        </p:blipFill>
-        <p:spPr>
-          <a:xfrm>
-            <a:off x="1445712" y="53262"/>
-            <a:ext cx="9300576" cy="6751476"/>
-          </a:xfrm>
-          <a:prstGeom prst="rect">
-            <a:avLst/>
-          </a:prstGeom>
-        </p:spPr>
-      </p:pic>
       <p:sp>
         <p:nvSpPr>
           <p:cNvPr id="3" name="Título 13">
@@ -26663,7 +27027,7 @@
           <p:nvPr/>
         </p:nvPicPr>
         <p:blipFill>
-          <a:blip r:embed="rId3">
+          <a:blip r:embed="rId2">
             <a:extLst>
               <a:ext uri="{28A0092B-C50C-407E-A947-70E740481C1C}">
                 <a14:useLocalDpi xmlns:a14="http://schemas.microsoft.com/office/drawing/2010/main" val="0"/>
@@ -26710,7 +27074,7 @@
           <p:nvPr/>
         </p:nvPicPr>
         <p:blipFill>
-          <a:blip r:embed="rId3">
+          <a:blip r:embed="rId2">
             <a:extLst>
               <a:ext uri="{28A0092B-C50C-407E-A947-70E740481C1C}">
                 <a14:useLocalDpi xmlns:a14="http://schemas.microsoft.com/office/drawing/2010/main" val="0"/>
@@ -26740,6 +27104,36 @@
               </a14:hiddenFill>
             </a:ext>
           </a:extLst>
+        </p:spPr>
+      </p:pic>
+      <p:pic>
+        <p:nvPicPr>
+          <p:cNvPr id="7" name="Imagem 6">
+            <a:extLst>
+              <a:ext uri="{FF2B5EF4-FFF2-40B4-BE49-F238E27FC236}">
+                <a16:creationId xmlns:a16="http://schemas.microsoft.com/office/drawing/2014/main" id="{248E168C-348A-46B8-99E7-0EB9BF95E7AD}"/>
+              </a:ext>
+            </a:extLst>
+          </p:cNvPr>
+          <p:cNvPicPr>
+            <a:picLocks noChangeAspect="1"/>
+          </p:cNvPicPr>
+          <p:nvPr/>
+        </p:nvPicPr>
+        <p:blipFill>
+          <a:blip r:embed="rId3"/>
+          <a:stretch>
+            <a:fillRect/>
+          </a:stretch>
+        </p:blipFill>
+        <p:spPr>
+          <a:xfrm>
+            <a:off x="2219268" y="191729"/>
+            <a:ext cx="7753464" cy="6474542"/>
+          </a:xfrm>
+          <a:prstGeom prst="rect">
+            <a:avLst/>
+          </a:prstGeom>
         </p:spPr>
       </p:pic>
     </p:spTree>
@@ -26868,7 +27262,7 @@
                                           </p:stCondLst>
                                         </p:cTn>
                                         <p:tgtEl>
-                                          <p:spTgt spid="6"/>
+                                          <p:spTgt spid="7"/>
                                         </p:tgtEl>
                                         <p:attrNameLst>
                                           <p:attrName>style.visibility</p:attrName>
@@ -26882,7 +27276,7 @@
                                       <p:cBhvr>
                                         <p:cTn id="14" dur="1000"/>
                                         <p:tgtEl>
-                                          <p:spTgt spid="6"/>
+                                          <p:spTgt spid="7"/>
                                         </p:tgtEl>
                                       </p:cBhvr>
                                     </p:animEffect>
@@ -26890,7 +27284,7 @@
                                       <p:cBhvr>
                                         <p:cTn id="15" dur="1000" fill="hold"/>
                                         <p:tgtEl>
-                                          <p:spTgt spid="6"/>
+                                          <p:spTgt spid="7"/>
                                         </p:tgtEl>
                                         <p:attrNameLst>
                                           <p:attrName>ppt_x</p:attrName>
@@ -26913,7 +27307,7 @@
                                       <p:cBhvr>
                                         <p:cTn id="16" dur="1000" fill="hold"/>
                                         <p:tgtEl>
-                                          <p:spTgt spid="6"/>
+                                          <p:spTgt spid="7"/>
                                         </p:tgtEl>
                                         <p:attrNameLst>
                                           <p:attrName>ppt_y</p:attrName>
@@ -26988,10 +27382,10 @@
       </p:grpSpPr>
       <p:pic>
         <p:nvPicPr>
-          <p:cNvPr id="7" name="Imagem 6">
+          <p:cNvPr id="3" name="Imagem 2">
             <a:extLst>
               <a:ext uri="{FF2B5EF4-FFF2-40B4-BE49-F238E27FC236}">
-                <a16:creationId xmlns:a16="http://schemas.microsoft.com/office/drawing/2014/main" id="{E0E408DF-75B8-4218-AD28-E1852BC34310}"/>
+                <a16:creationId xmlns:a16="http://schemas.microsoft.com/office/drawing/2014/main" id="{BE9B3D5C-F4CE-4B61-8514-34A605656AC2}"/>
               </a:ext>
             </a:extLst>
           </p:cNvPr>
@@ -27008,8 +27402,8 @@
         </p:blipFill>
         <p:spPr>
           <a:xfrm>
-            <a:off x="783914" y="179419"/>
-            <a:ext cx="10624171" cy="5860531"/>
+            <a:off x="1265238" y="887233"/>
+            <a:ext cx="9661523" cy="5083534"/>
           </a:xfrm>
           <a:prstGeom prst="rect">
             <a:avLst/>
@@ -27201,7 +27595,7 @@
                                           </p:stCondLst>
                                         </p:cTn>
                                         <p:tgtEl>
-                                          <p:spTgt spid="7"/>
+                                          <p:spTgt spid="3"/>
                                         </p:tgtEl>
                                         <p:attrNameLst>
                                           <p:attrName>style.visibility</p:attrName>
@@ -27215,7 +27609,7 @@
                                       <p:cBhvr>
                                         <p:cTn id="11" dur="1000"/>
                                         <p:tgtEl>
-                                          <p:spTgt spid="7"/>
+                                          <p:spTgt spid="3"/>
                                         </p:tgtEl>
                                       </p:cBhvr>
                                     </p:animEffect>
@@ -27223,7 +27617,7 @@
                                       <p:cBhvr>
                                         <p:cTn id="12" dur="1000" fill="hold"/>
                                         <p:tgtEl>
-                                          <p:spTgt spid="7"/>
+                                          <p:spTgt spid="3"/>
                                         </p:tgtEl>
                                         <p:attrNameLst>
                                           <p:attrName>ppt_x</p:attrName>
@@ -27246,7 +27640,7 @@
                                       <p:cBhvr>
                                         <p:cTn id="13" dur="1000" fill="hold"/>
                                         <p:tgtEl>
-                                          <p:spTgt spid="7"/>
+                                          <p:spTgt spid="3"/>
                                         </p:tgtEl>
                                         <p:attrNameLst>
                                           <p:attrName>ppt_y</p:attrName>

</xml_diff>